<commit_message>
more fleshed out ppt
</commit_message>
<xml_diff>
--- a/ProjectPresentation.pptx
+++ b/ProjectPresentation.pptx
@@ -14,13 +14,16 @@
     <p:sldId id="262" r:id="rId8"/>
     <p:sldId id="263" r:id="rId9"/>
     <p:sldId id="264" r:id="rId10"/>
-    <p:sldId id="265" r:id="rId11"/>
-    <p:sldId id="266" r:id="rId12"/>
-    <p:sldId id="267" r:id="rId13"/>
-    <p:sldId id="268" r:id="rId14"/>
-    <p:sldId id="269" r:id="rId15"/>
-    <p:sldId id="271" r:id="rId16"/>
-    <p:sldId id="270" r:id="rId17"/>
+    <p:sldId id="272" r:id="rId11"/>
+    <p:sldId id="273" r:id="rId12"/>
+    <p:sldId id="265" r:id="rId13"/>
+    <p:sldId id="266" r:id="rId14"/>
+    <p:sldId id="267" r:id="rId15"/>
+    <p:sldId id="274" r:id="rId16"/>
+    <p:sldId id="268" r:id="rId17"/>
+    <p:sldId id="269" r:id="rId18"/>
+    <p:sldId id="271" r:id="rId19"/>
+    <p:sldId id="270" r:id="rId20"/>
   </p:sldIdLst>
   <p:sldSz cx="9144000" cy="6858000" type="screen4x3"/>
   <p:notesSz cx="6858000" cy="9144000"/>
@@ -2665,38 +2668,38 @@
           <a:p>
             <a:pPr lvl="0"/>
             <a:r>
-              <a:rPr lang="en-US" smtClean="0"/>
+              <a:rPr lang="en-US" dirty="0" smtClean="0"/>
               <a:t>Click to edit Master text styles</a:t>
             </a:r>
           </a:p>
           <a:p>
             <a:pPr lvl="1"/>
             <a:r>
-              <a:rPr lang="en-US" smtClean="0"/>
+              <a:rPr lang="en-US" dirty="0" smtClean="0"/>
               <a:t>Second level</a:t>
             </a:r>
           </a:p>
           <a:p>
             <a:pPr lvl="2"/>
             <a:r>
-              <a:rPr lang="en-US" smtClean="0"/>
+              <a:rPr lang="en-US" dirty="0" smtClean="0"/>
               <a:t>Third level</a:t>
             </a:r>
           </a:p>
           <a:p>
             <a:pPr lvl="3"/>
             <a:r>
-              <a:rPr lang="en-US" smtClean="0"/>
+              <a:rPr lang="en-US" dirty="0" smtClean="0"/>
               <a:t>Fourth level</a:t>
             </a:r>
           </a:p>
           <a:p>
             <a:pPr lvl="4"/>
             <a:r>
-              <a:rPr lang="en-US" smtClean="0"/>
+              <a:rPr lang="en-US" dirty="0" smtClean="0"/>
               <a:t>Fifth level</a:t>
             </a:r>
-            <a:endParaRPr lang="en-US"/>
+            <a:endParaRPr lang="en-US" dirty="0"/>
           </a:p>
         </p:txBody>
       </p:sp>
@@ -2858,12 +2861,12 @@
       </a:lvl1pPr>
     </p:titleStyle>
     <p:bodyStyle>
-      <a:lvl1pPr marL="342900" indent="-342900" algn="l" defTabSz="457200" rtl="0" eaLnBrk="1" latinLnBrk="0" hangingPunct="1">
+      <a:lvl1pPr marL="0" indent="0" algn="l" defTabSz="457200" rtl="0" eaLnBrk="1" latinLnBrk="0" hangingPunct="1">
         <a:spcBef>
           <a:spcPct val="20000"/>
         </a:spcBef>
         <a:buFont typeface="Arial"/>
-        <a:buChar char="•"/>
+        <a:buNone/>
         <a:defRPr sz="3200" kern="1200">
           <a:solidFill>
             <a:schemeClr val="tx1"/>
@@ -2873,12 +2876,12 @@
           <a:cs typeface="+mn-cs"/>
         </a:defRPr>
       </a:lvl1pPr>
-      <a:lvl2pPr marL="742950" indent="-285750" algn="l" defTabSz="457200" rtl="0" eaLnBrk="1" latinLnBrk="0" hangingPunct="1">
+      <a:lvl2pPr marL="457200" indent="0" algn="l" defTabSz="457200" rtl="0" eaLnBrk="1" latinLnBrk="0" hangingPunct="1">
         <a:spcBef>
           <a:spcPct val="20000"/>
         </a:spcBef>
         <a:buFont typeface="Arial"/>
-        <a:buChar char="–"/>
+        <a:buNone/>
         <a:defRPr sz="2800" kern="1200">
           <a:solidFill>
             <a:schemeClr val="tx1"/>
@@ -2888,12 +2891,12 @@
           <a:cs typeface="+mn-cs"/>
         </a:defRPr>
       </a:lvl2pPr>
-      <a:lvl3pPr marL="1143000" indent="-228600" algn="l" defTabSz="457200" rtl="0" eaLnBrk="1" latinLnBrk="0" hangingPunct="1">
+      <a:lvl3pPr marL="914400" indent="0" algn="l" defTabSz="457200" rtl="0" eaLnBrk="1" latinLnBrk="0" hangingPunct="1">
         <a:spcBef>
           <a:spcPct val="20000"/>
         </a:spcBef>
         <a:buFont typeface="Arial"/>
-        <a:buChar char="•"/>
+        <a:buNone/>
         <a:defRPr sz="2400" kern="1200">
           <a:solidFill>
             <a:schemeClr val="tx1"/>
@@ -2903,12 +2906,12 @@
           <a:cs typeface="+mn-cs"/>
         </a:defRPr>
       </a:lvl3pPr>
-      <a:lvl4pPr marL="1600200" indent="-228600" algn="l" defTabSz="457200" rtl="0" eaLnBrk="1" latinLnBrk="0" hangingPunct="1">
+      <a:lvl4pPr marL="1371600" indent="0" algn="l" defTabSz="457200" rtl="0" eaLnBrk="1" latinLnBrk="0" hangingPunct="1">
         <a:spcBef>
           <a:spcPct val="20000"/>
         </a:spcBef>
         <a:buFont typeface="Arial"/>
-        <a:buChar char="–"/>
+        <a:buNone/>
         <a:defRPr sz="2000" kern="1200">
           <a:solidFill>
             <a:schemeClr val="tx1"/>
@@ -2918,12 +2921,12 @@
           <a:cs typeface="+mn-cs"/>
         </a:defRPr>
       </a:lvl4pPr>
-      <a:lvl5pPr marL="2057400" indent="-228600" algn="l" defTabSz="457200" rtl="0" eaLnBrk="1" latinLnBrk="0" hangingPunct="1">
+      <a:lvl5pPr marL="1828800" indent="0" algn="l" defTabSz="457200" rtl="0" eaLnBrk="1" latinLnBrk="0" hangingPunct="1">
         <a:spcBef>
           <a:spcPct val="20000"/>
         </a:spcBef>
         <a:buFont typeface="Arial"/>
-        <a:buChar char="»"/>
+        <a:buNone/>
         <a:defRPr sz="2000" kern="1200">
           <a:solidFill>
             <a:schemeClr val="tx1"/>
@@ -3127,7 +3130,15 @@
           <a:p>
             <a:r>
               <a:rPr lang="en-US" dirty="0" smtClean="0"/>
-              <a:t>Assessing Clustering Pipelines</a:t>
+              <a:t>Assessing </a:t>
+            </a:r>
+            <a:r>
+              <a:rPr lang="en-US" dirty="0" smtClean="0"/>
+              <a:t>Clustering </a:t>
+            </a:r>
+            <a:r>
+              <a:rPr lang="en-US" dirty="0" smtClean="0"/>
+              <a:t>Pipelines</a:t>
             </a:r>
             <a:endParaRPr lang="en-US" dirty="0"/>
           </a:p>
@@ -3148,7 +3159,32 @@
           <a:bodyPr/>
           <a:lstStyle/>
           <a:p>
-            <a:endParaRPr lang="en-US"/>
+            <a:r>
+              <a:rPr lang="en-US" dirty="0" smtClean="0"/>
+              <a:t>Taylor </a:t>
+            </a:r>
+            <a:r>
+              <a:rPr lang="en-US" dirty="0" err="1" smtClean="0"/>
+              <a:t>Jaraczewski</a:t>
+            </a:r>
+            <a:endParaRPr lang="en-US" dirty="0" smtClean="0"/>
+          </a:p>
+          <a:p>
+            <a:r>
+              <a:rPr lang="en-US" dirty="0" err="1" smtClean="0"/>
+              <a:t>Haixang</a:t>
+            </a:r>
+            <a:r>
+              <a:rPr lang="en-US" dirty="0" smtClean="0"/>
+              <a:t> Liu</a:t>
+            </a:r>
+          </a:p>
+          <a:p>
+            <a:r>
+              <a:rPr lang="en-US" dirty="0" smtClean="0"/>
+              <a:t>Erkin Otles</a:t>
+            </a:r>
+            <a:endParaRPr lang="en-US" dirty="0"/>
           </a:p>
         </p:txBody>
       </p:sp>
@@ -3199,7 +3235,7 @@
           <a:p>
             <a:r>
               <a:rPr lang="en-US" dirty="0" smtClean="0"/>
-              <a:t>Results</a:t>
+              <a:t>Anticipated Results</a:t>
             </a:r>
             <a:endParaRPr lang="en-US" dirty="0"/>
           </a:p>
@@ -3207,27 +3243,33 @@
       </p:sp>
       <p:sp>
         <p:nvSpPr>
-          <p:cNvPr id="3" name="Text Placeholder 2"/>
-          <p:cNvSpPr>
-            <a:spLocks noGrp="1"/>
-          </p:cNvSpPr>
-          <p:nvPr>
-            <p:ph type="body" idx="1"/>
-          </p:nvPr>
-        </p:nvSpPr>
-        <p:spPr/>
-        <p:txBody>
-          <a:bodyPr/>
-          <a:lstStyle/>
-          <a:p>
-            <a:endParaRPr lang="en-US"/>
+          <p:cNvPr id="3" name="Content Placeholder 2"/>
+          <p:cNvSpPr>
+            <a:spLocks noGrp="1"/>
+          </p:cNvSpPr>
+          <p:nvPr>
+            <p:ph idx="1"/>
+          </p:nvPr>
+        </p:nvSpPr>
+        <p:spPr/>
+        <p:txBody>
+          <a:bodyPr>
+            <a:normAutofit fontScale="85000" lnSpcReduction="20000"/>
+          </a:bodyPr>
+          <a:lstStyle/>
+          <a:p>
+            <a:r>
+              <a:rPr lang="en-US" dirty="0"/>
+              <a:t>After running the different algorithms presented in the methods section each will be assessed by looking at the clustering output. Upon looking at this initial output, the algorithms will be perturbed by changing individual assumptions made within each. In changing certain assumptions it is expected that certain algorithms may have a difference in the clustered output. Two primary questions will be asked: 1) is the clustered output, and transitively, the efficacy of cell lines dependent on the specific pipeline used and 2) can the output of certain pipelines be modulated by changing some of the assumptions.</a:t>
+            </a:r>
+            <a:endParaRPr lang="en-US" dirty="0"/>
           </a:p>
         </p:txBody>
       </p:sp>
     </p:spTree>
     <p:extLst>
       <p:ext uri="{BB962C8B-B14F-4D97-AF65-F5344CB8AC3E}">
-        <p14:creationId xmlns:p14="http://schemas.microsoft.com/office/powerpoint/2010/main" val="118508907"/>
+        <p14:creationId xmlns:p14="http://schemas.microsoft.com/office/powerpoint/2010/main" val="787227608"/>
       </p:ext>
     </p:extLst>
   </p:cSld>
@@ -3270,8 +3312,8 @@
           <a:lstStyle/>
           <a:p>
             <a:r>
-              <a:rPr lang="en-US" dirty="0" err="1" smtClean="0"/>
-              <a:t>Heatmaps</a:t>
+              <a:rPr lang="en-US" dirty="0" smtClean="0"/>
+              <a:t>Data Sources</a:t>
             </a:r>
             <a:endParaRPr lang="en-US" dirty="0"/>
           </a:p>
@@ -3292,14 +3334,42 @@
           <a:bodyPr/>
           <a:lstStyle/>
           <a:p>
-            <a:endParaRPr lang="en-US"/>
+            <a:r>
+              <a:rPr lang="en-US" dirty="0" smtClean="0"/>
+              <a:t>TCGA</a:t>
+            </a:r>
+          </a:p>
+          <a:p>
+            <a:endParaRPr lang="en-US" dirty="0"/>
+          </a:p>
+          <a:p>
+            <a:r>
+              <a:rPr lang="en-US" dirty="0" smtClean="0"/>
+              <a:t>CCLE</a:t>
+            </a:r>
+          </a:p>
+          <a:p>
+            <a:endParaRPr lang="en-US" dirty="0"/>
+          </a:p>
+          <a:p>
+            <a:r>
+              <a:rPr lang="en-US" dirty="0" smtClean="0"/>
+              <a:t>GBM</a:t>
+            </a:r>
+          </a:p>
+          <a:p>
+            <a:r>
+              <a:rPr lang="en-US" dirty="0" smtClean="0"/>
+              <a:t>Ovarian</a:t>
+            </a:r>
+            <a:endParaRPr lang="en-US" dirty="0"/>
           </a:p>
         </p:txBody>
       </p:sp>
     </p:spTree>
     <p:extLst>
       <p:ext uri="{BB962C8B-B14F-4D97-AF65-F5344CB8AC3E}">
-        <p14:creationId xmlns:p14="http://schemas.microsoft.com/office/powerpoint/2010/main" val="3994164514"/>
+        <p14:creationId xmlns:p14="http://schemas.microsoft.com/office/powerpoint/2010/main" val="2387585825"/>
       </p:ext>
     </p:extLst>
   </p:cSld>
@@ -3343,7 +3413,7 @@
           <a:p>
             <a:r>
               <a:rPr lang="en-US" dirty="0" smtClean="0"/>
-              <a:t>PCA</a:t>
+              <a:t>Results</a:t>
             </a:r>
             <a:endParaRPr lang="en-US" dirty="0"/>
           </a:p>
@@ -3351,12 +3421,12 @@
       </p:sp>
       <p:sp>
         <p:nvSpPr>
-          <p:cNvPr id="3" name="Content Placeholder 2"/>
-          <p:cNvSpPr>
-            <a:spLocks noGrp="1"/>
-          </p:cNvSpPr>
-          <p:nvPr>
-            <p:ph idx="1"/>
+          <p:cNvPr id="3" name="Text Placeholder 2"/>
+          <p:cNvSpPr>
+            <a:spLocks noGrp="1"/>
+          </p:cNvSpPr>
+          <p:nvPr>
+            <p:ph type="body" idx="1"/>
           </p:nvPr>
         </p:nvSpPr>
         <p:spPr/>
@@ -3371,7 +3441,7 @@
     </p:spTree>
     <p:extLst>
       <p:ext uri="{BB962C8B-B14F-4D97-AF65-F5344CB8AC3E}">
-        <p14:creationId xmlns:p14="http://schemas.microsoft.com/office/powerpoint/2010/main" val="2703260260"/>
+        <p14:creationId xmlns:p14="http://schemas.microsoft.com/office/powerpoint/2010/main" val="118508907"/>
       </p:ext>
     </p:extLst>
   </p:cSld>
@@ -3414,8 +3484,8 @@
           <a:lstStyle/>
           <a:p>
             <a:r>
-              <a:rPr lang="en-US" dirty="0" smtClean="0"/>
-              <a:t>Discussion</a:t>
+              <a:rPr lang="en-US" dirty="0" err="1" smtClean="0"/>
+              <a:t>Heatmaps</a:t>
             </a:r>
             <a:endParaRPr lang="en-US" dirty="0"/>
           </a:p>
@@ -3423,12 +3493,12 @@
       </p:sp>
       <p:sp>
         <p:nvSpPr>
-          <p:cNvPr id="3" name="Text Placeholder 2"/>
-          <p:cNvSpPr>
-            <a:spLocks noGrp="1"/>
-          </p:cNvSpPr>
-          <p:nvPr>
-            <p:ph type="body" idx="1"/>
+          <p:cNvPr id="3" name="Content Placeholder 2"/>
+          <p:cNvSpPr>
+            <a:spLocks noGrp="1"/>
+          </p:cNvSpPr>
+          <p:nvPr>
+            <p:ph idx="1"/>
           </p:nvPr>
         </p:nvSpPr>
         <p:spPr/>
@@ -3443,7 +3513,7 @@
     </p:spTree>
     <p:extLst>
       <p:ext uri="{BB962C8B-B14F-4D97-AF65-F5344CB8AC3E}">
-        <p14:creationId xmlns:p14="http://schemas.microsoft.com/office/powerpoint/2010/main" val="3287192822"/>
+        <p14:creationId xmlns:p14="http://schemas.microsoft.com/office/powerpoint/2010/main" val="3994164514"/>
       </p:ext>
     </p:extLst>
   </p:cSld>
@@ -3487,7 +3557,7 @@
           <a:p>
             <a:r>
               <a:rPr lang="en-US" dirty="0" smtClean="0"/>
-              <a:t>Challenges</a:t>
+              <a:t>PCA</a:t>
             </a:r>
             <a:endParaRPr lang="en-US" dirty="0"/>
           </a:p>
@@ -3515,7 +3585,7 @@
     </p:spTree>
     <p:extLst>
       <p:ext uri="{BB962C8B-B14F-4D97-AF65-F5344CB8AC3E}">
-        <p14:creationId xmlns:p14="http://schemas.microsoft.com/office/powerpoint/2010/main" val="1522108323"/>
+        <p14:creationId xmlns:p14="http://schemas.microsoft.com/office/powerpoint/2010/main" val="2703260260"/>
       </p:ext>
     </p:extLst>
   </p:cSld>
@@ -3559,7 +3629,7 @@
           <a:p>
             <a:r>
               <a:rPr lang="en-US" dirty="0" smtClean="0"/>
-              <a:t>Future Work</a:t>
+              <a:t>Summary of Findings</a:t>
             </a:r>
             <a:endParaRPr lang="en-US" dirty="0"/>
           </a:p>
@@ -3577,17 +3647,47 @@
         </p:nvSpPr>
         <p:spPr/>
         <p:txBody>
-          <a:bodyPr/>
-          <a:lstStyle/>
-          <a:p>
-            <a:endParaRPr lang="en-US"/>
+          <a:bodyPr>
+            <a:normAutofit fontScale="70000" lnSpcReduction="20000"/>
+          </a:bodyPr>
+          <a:lstStyle/>
+          <a:p>
+            <a:endParaRPr lang="en-US" dirty="0" smtClean="0"/>
+          </a:p>
+          <a:p>
+            <a:endParaRPr lang="en-US" dirty="0"/>
+          </a:p>
+          <a:p>
+            <a:endParaRPr lang="en-US" dirty="0" smtClean="0"/>
+          </a:p>
+          <a:p>
+            <a:r>
+              <a:rPr lang="en-US" dirty="0" err="1" smtClean="0"/>
+              <a:t>Gitter</a:t>
+            </a:r>
+            <a:r>
+              <a:rPr lang="en-US" dirty="0" smtClean="0"/>
+              <a:t> Note:</a:t>
+            </a:r>
+            <a:endParaRPr lang="en-US" dirty="0"/>
+          </a:p>
+          <a:p>
+            <a:r>
+              <a:rPr lang="en-US" dirty="0" smtClean="0"/>
+              <a:t>Finally</a:t>
+            </a:r>
+            <a:r>
+              <a:rPr lang="en-US" dirty="0"/>
+              <a:t>, as you note in your report, as major challenge will be performing a summarizing meta-analysis to interpret the many clustering results. It will be difficult to interpret your results if they are presented as a series of clustering outputs without any further summarization. Try to arrive at a concise conclusion based on your data - i.e. these cell lines are good models of these tumor samples or cell line/tumor similarity is determined by step X in the pipeline as opposed to an inherent biological feature - and present the results in a way that builds toward that conclusion.</a:t>
+            </a:r>
+            <a:endParaRPr lang="en-US" dirty="0"/>
           </a:p>
         </p:txBody>
       </p:sp>
     </p:spTree>
     <p:extLst>
       <p:ext uri="{BB962C8B-B14F-4D97-AF65-F5344CB8AC3E}">
-        <p14:creationId xmlns:p14="http://schemas.microsoft.com/office/powerpoint/2010/main" val="2074855179"/>
+        <p14:creationId xmlns:p14="http://schemas.microsoft.com/office/powerpoint/2010/main" val="97556309"/>
       </p:ext>
     </p:extLst>
   </p:cSld>
@@ -3631,6 +3731,251 @@
           <a:p>
             <a:r>
               <a:rPr lang="en-US" dirty="0" smtClean="0"/>
+              <a:t>Discussion</a:t>
+            </a:r>
+            <a:endParaRPr lang="en-US" dirty="0"/>
+          </a:p>
+        </p:txBody>
+      </p:sp>
+      <p:sp>
+        <p:nvSpPr>
+          <p:cNvPr id="3" name="Text Placeholder 2"/>
+          <p:cNvSpPr>
+            <a:spLocks noGrp="1"/>
+          </p:cNvSpPr>
+          <p:nvPr>
+            <p:ph type="body" idx="1"/>
+          </p:nvPr>
+        </p:nvSpPr>
+        <p:spPr/>
+        <p:txBody>
+          <a:bodyPr/>
+          <a:lstStyle/>
+          <a:p>
+            <a:endParaRPr lang="en-US"/>
+          </a:p>
+        </p:txBody>
+      </p:sp>
+    </p:spTree>
+    <p:extLst>
+      <p:ext uri="{BB962C8B-B14F-4D97-AF65-F5344CB8AC3E}">
+        <p14:creationId xmlns:p14="http://schemas.microsoft.com/office/powerpoint/2010/main" val="3287192822"/>
+      </p:ext>
+    </p:extLst>
+  </p:cSld>
+  <p:clrMapOvr>
+    <a:masterClrMapping/>
+  </p:clrMapOvr>
+</p:sld>
+</file>
+
+<file path=ppt/slides/slide17.xml><?xml version="1.0" encoding="utf-8"?>
+<p:sld xmlns:a="http://schemas.openxmlformats.org/drawingml/2006/main" xmlns:r="http://schemas.openxmlformats.org/officeDocument/2006/relationships" xmlns:p="http://schemas.openxmlformats.org/presentationml/2006/main">
+  <p:cSld>
+    <p:spTree>
+      <p:nvGrpSpPr>
+        <p:cNvPr id="1" name=""/>
+        <p:cNvGrpSpPr/>
+        <p:nvPr/>
+      </p:nvGrpSpPr>
+      <p:grpSpPr>
+        <a:xfrm>
+          <a:off x="0" y="0"/>
+          <a:ext cx="0" cy="0"/>
+          <a:chOff x="0" y="0"/>
+          <a:chExt cx="0" cy="0"/>
+        </a:xfrm>
+      </p:grpSpPr>
+      <p:sp>
+        <p:nvSpPr>
+          <p:cNvPr id="2" name="Title 1"/>
+          <p:cNvSpPr>
+            <a:spLocks noGrp="1"/>
+          </p:cNvSpPr>
+          <p:nvPr>
+            <p:ph type="title"/>
+          </p:nvPr>
+        </p:nvSpPr>
+        <p:spPr/>
+        <p:txBody>
+          <a:bodyPr/>
+          <a:lstStyle/>
+          <a:p>
+            <a:r>
+              <a:rPr lang="en-US" dirty="0" smtClean="0"/>
+              <a:t>Challenges</a:t>
+            </a:r>
+            <a:endParaRPr lang="en-US" dirty="0"/>
+          </a:p>
+        </p:txBody>
+      </p:sp>
+      <p:sp>
+        <p:nvSpPr>
+          <p:cNvPr id="3" name="Content Placeholder 2"/>
+          <p:cNvSpPr>
+            <a:spLocks noGrp="1"/>
+          </p:cNvSpPr>
+          <p:nvPr>
+            <p:ph idx="1"/>
+          </p:nvPr>
+        </p:nvSpPr>
+        <p:spPr/>
+        <p:txBody>
+          <a:bodyPr/>
+          <a:lstStyle/>
+          <a:p>
+            <a:r>
+              <a:rPr lang="en-US" dirty="0" err="1" smtClean="0"/>
+              <a:t>Heatmap</a:t>
+            </a:r>
+            <a:r>
+              <a:rPr lang="en-US" dirty="0" smtClean="0"/>
+              <a:t> generation can be slow and cumbersome</a:t>
+            </a:r>
+          </a:p>
+          <a:p>
+            <a:endParaRPr lang="en-US" dirty="0"/>
+          </a:p>
+          <a:p>
+            <a:r>
+              <a:rPr lang="en-US" dirty="0" smtClean="0"/>
+              <a:t>Data in “rawest” form is difficult to handle</a:t>
+            </a:r>
+          </a:p>
+          <a:p>
+            <a:endParaRPr lang="en-US" dirty="0"/>
+          </a:p>
+          <a:p>
+            <a:r>
+              <a:rPr lang="en-US" dirty="0" smtClean="0"/>
+              <a:t>Downloading data</a:t>
+            </a:r>
+          </a:p>
+        </p:txBody>
+      </p:sp>
+    </p:spTree>
+    <p:extLst>
+      <p:ext uri="{BB962C8B-B14F-4D97-AF65-F5344CB8AC3E}">
+        <p14:creationId xmlns:p14="http://schemas.microsoft.com/office/powerpoint/2010/main" val="1522108323"/>
+      </p:ext>
+    </p:extLst>
+  </p:cSld>
+  <p:clrMapOvr>
+    <a:masterClrMapping/>
+  </p:clrMapOvr>
+</p:sld>
+</file>
+
+<file path=ppt/slides/slide18.xml><?xml version="1.0" encoding="utf-8"?>
+<p:sld xmlns:a="http://schemas.openxmlformats.org/drawingml/2006/main" xmlns:r="http://schemas.openxmlformats.org/officeDocument/2006/relationships" xmlns:p="http://schemas.openxmlformats.org/presentationml/2006/main">
+  <p:cSld>
+    <p:spTree>
+      <p:nvGrpSpPr>
+        <p:cNvPr id="1" name=""/>
+        <p:cNvGrpSpPr/>
+        <p:nvPr/>
+      </p:nvGrpSpPr>
+      <p:grpSpPr>
+        <a:xfrm>
+          <a:off x="0" y="0"/>
+          <a:ext cx="0" cy="0"/>
+          <a:chOff x="0" y="0"/>
+          <a:chExt cx="0" cy="0"/>
+        </a:xfrm>
+      </p:grpSpPr>
+      <p:sp>
+        <p:nvSpPr>
+          <p:cNvPr id="2" name="Title 1"/>
+          <p:cNvSpPr>
+            <a:spLocks noGrp="1"/>
+          </p:cNvSpPr>
+          <p:nvPr>
+            <p:ph type="title"/>
+          </p:nvPr>
+        </p:nvSpPr>
+        <p:spPr/>
+        <p:txBody>
+          <a:bodyPr/>
+          <a:lstStyle/>
+          <a:p>
+            <a:r>
+              <a:rPr lang="en-US" dirty="0" smtClean="0"/>
+              <a:t>Future Work</a:t>
+            </a:r>
+            <a:endParaRPr lang="en-US" dirty="0"/>
+          </a:p>
+        </p:txBody>
+      </p:sp>
+      <p:sp>
+        <p:nvSpPr>
+          <p:cNvPr id="3" name="Content Placeholder 2"/>
+          <p:cNvSpPr>
+            <a:spLocks noGrp="1"/>
+          </p:cNvSpPr>
+          <p:nvPr>
+            <p:ph idx="1"/>
+          </p:nvPr>
+        </p:nvSpPr>
+        <p:spPr/>
+        <p:txBody>
+          <a:bodyPr/>
+          <a:lstStyle/>
+          <a:p>
+            <a:r>
+              <a:rPr lang="en-US" dirty="0" smtClean="0"/>
+              <a:t>Normalization on pan cancer </a:t>
+            </a:r>
+            <a:endParaRPr lang="en-US" dirty="0"/>
+          </a:p>
+        </p:txBody>
+      </p:sp>
+    </p:spTree>
+    <p:extLst>
+      <p:ext uri="{BB962C8B-B14F-4D97-AF65-F5344CB8AC3E}">
+        <p14:creationId xmlns:p14="http://schemas.microsoft.com/office/powerpoint/2010/main" val="2074855179"/>
+      </p:ext>
+    </p:extLst>
+  </p:cSld>
+  <p:clrMapOvr>
+    <a:masterClrMapping/>
+  </p:clrMapOvr>
+</p:sld>
+</file>
+
+<file path=ppt/slides/slide19.xml><?xml version="1.0" encoding="utf-8"?>
+<p:sld xmlns:a="http://schemas.openxmlformats.org/drawingml/2006/main" xmlns:r="http://schemas.openxmlformats.org/officeDocument/2006/relationships" xmlns:p="http://schemas.openxmlformats.org/presentationml/2006/main">
+  <p:cSld>
+    <p:spTree>
+      <p:nvGrpSpPr>
+        <p:cNvPr id="1" name=""/>
+        <p:cNvGrpSpPr/>
+        <p:nvPr/>
+      </p:nvGrpSpPr>
+      <p:grpSpPr>
+        <a:xfrm>
+          <a:off x="0" y="0"/>
+          <a:ext cx="0" cy="0"/>
+          <a:chOff x="0" y="0"/>
+          <a:chExt cx="0" cy="0"/>
+        </a:xfrm>
+      </p:grpSpPr>
+      <p:sp>
+        <p:nvSpPr>
+          <p:cNvPr id="2" name="Title 1"/>
+          <p:cNvSpPr>
+            <a:spLocks noGrp="1"/>
+          </p:cNvSpPr>
+          <p:nvPr>
+            <p:ph type="title"/>
+          </p:nvPr>
+        </p:nvSpPr>
+        <p:spPr/>
+        <p:txBody>
+          <a:bodyPr/>
+          <a:lstStyle/>
+          <a:p>
+            <a:r>
+              <a:rPr lang="en-US" dirty="0" smtClean="0"/>
               <a:t>References</a:t>
             </a:r>
             <a:endParaRPr lang="en-US" dirty="0"/>
@@ -3649,10 +3994,82 @@
         </p:nvSpPr>
         <p:spPr/>
         <p:txBody>
-          <a:bodyPr/>
-          <a:lstStyle/>
-          <a:p>
-            <a:endParaRPr lang="en-US"/>
+          <a:bodyPr>
+            <a:normAutofit fontScale="77500" lnSpcReduction="20000"/>
+          </a:bodyPr>
+          <a:lstStyle/>
+          <a:p>
+            <a:r>
+              <a:rPr lang="en-US" dirty="0"/>
+              <a:t>[1] </a:t>
+            </a:r>
+            <a:r>
+              <a:rPr lang="en-US" dirty="0" err="1"/>
+              <a:t>Barretina</a:t>
+            </a:r>
+            <a:r>
+              <a:rPr lang="en-US" dirty="0"/>
+              <a:t>, </a:t>
+            </a:r>
+            <a:r>
+              <a:rPr lang="en-US" dirty="0" err="1"/>
+              <a:t>Jordi</a:t>
+            </a:r>
+            <a:r>
+              <a:rPr lang="en-US" dirty="0"/>
+              <a:t>, et al. "The Cancer Cell Line Encyclopedia enables predictive </a:t>
+            </a:r>
+            <a:r>
+              <a:rPr lang="en-US" dirty="0" err="1"/>
+              <a:t>modelling</a:t>
+            </a:r>
+            <a:r>
+              <a:rPr lang="en-US" dirty="0"/>
+              <a:t> of anticancer drug sensitivity." Nature 483.7391 (2012): 603-607.</a:t>
+            </a:r>
+          </a:p>
+          <a:p>
+            <a:r>
+              <a:rPr lang="en-US" dirty="0"/>
+              <a:t>[2] </a:t>
+            </a:r>
+            <a:r>
+              <a:rPr lang="en-US" dirty="0" err="1"/>
+              <a:t>Domcke</a:t>
+            </a:r>
+            <a:r>
+              <a:rPr lang="en-US" dirty="0"/>
+              <a:t>, Silvia, et al. "Evaluating cell lines as </a:t>
+            </a:r>
+            <a:r>
+              <a:rPr lang="en-US" dirty="0" err="1"/>
+              <a:t>tumour</a:t>
+            </a:r>
+            <a:r>
+              <a:rPr lang="en-US" dirty="0"/>
+              <a:t> models by comparison of genomic profiles." Nature communications 4 (2013).</a:t>
+            </a:r>
+          </a:p>
+          <a:p>
+            <a:r>
+              <a:rPr lang="en-US" dirty="0"/>
+              <a:t>[3] Leek, Jeffrey T., et al. "The </a:t>
+            </a:r>
+            <a:r>
+              <a:rPr lang="en-US" dirty="0" err="1"/>
+              <a:t>sva</a:t>
+            </a:r>
+            <a:r>
+              <a:rPr lang="en-US" dirty="0"/>
+              <a:t> package for removing batch effects and other unwanted variation in high-throughput experiments." Bioinformatics 28.6 (2012): 882-883.</a:t>
+            </a:r>
+          </a:p>
+          <a:p>
+            <a:r>
+              <a:rPr lang="en-US" dirty="0"/>
+              <a:t>[4] Cancer Genome Atlas Research Network. "Integrated genomic analyses of ovarian carcinoma." Nature 474.7353 (2011): 609-615.</a:t>
+            </a:r>
+            <a:endParaRPr lang="en-US" dirty="0"/>
           </a:p>
         </p:txBody>
       </p:sp>
@@ -3724,7 +4141,17 @@
           <a:bodyPr/>
           <a:lstStyle/>
           <a:p>
-            <a:endParaRPr lang="en-US"/>
+            <a:r>
+              <a:rPr lang="en-US" dirty="0" smtClean="0"/>
+              <a:t>Cancer </a:t>
+            </a:r>
+            <a:r>
+              <a:rPr lang="en-US" dirty="0" smtClean="0">
+                <a:sym typeface="Wingdings"/>
+              </a:rPr>
+              <a:t></a:t>
+            </a:r>
+            <a:endParaRPr lang="en-US" dirty="0"/>
           </a:p>
         </p:txBody>
       </p:sp>
@@ -3865,10 +4292,16 @@
         </p:nvSpPr>
         <p:spPr/>
         <p:txBody>
-          <a:bodyPr/>
-          <a:lstStyle/>
-          <a:p>
-            <a:endParaRPr lang="en-US"/>
+          <a:bodyPr>
+            <a:normAutofit fontScale="70000" lnSpcReduction="20000"/>
+          </a:bodyPr>
+          <a:lstStyle/>
+          <a:p>
+            <a:r>
+              <a:rPr lang="en-US" dirty="0"/>
+              <a:t>A grand debate has been present in the cancer biology research community in reference to the accuracy of using cell lines as accurate representations of a tumor. To delve into the efficacy of cancer cell lines many researchers have used hierarchical clustering to show the genomic difference between the two model systems. While some researchers have found cancer cell lines to be a useful model1 others have shown that many cell lines are poor representations of their respective primary samples. 2 Delving further into this paradox, it is readily obvious that one of the primary differences between these two findings is the clustering pipelines that each utilizes. Not only is the clustering algorithm itself different but also the pre processing steps to “prepare” the data is different. This project is being proposed to evaluate a number of different clustering algorithms to assess and validate the numerous assumptions that are used in each.</a:t>
+            </a:r>
+            <a:endParaRPr lang="en-US" dirty="0"/>
           </a:p>
         </p:txBody>
       </p:sp>
@@ -4066,8 +4499,8 @@
               <a:t>Methodological </a:t>
             </a:r>
             <a:r>
-              <a:rPr lang="en-US" dirty="0" err="1" smtClean="0"/>
-              <a:t>Overivew</a:t>
+              <a:rPr lang="en-US" dirty="0" smtClean="0"/>
+              <a:t>Overview</a:t>
             </a:r>
             <a:endParaRPr lang="en-US" dirty="0"/>
           </a:p>
@@ -4088,7 +4521,11 @@
           <a:bodyPr/>
           <a:lstStyle/>
           <a:p>
-            <a:endParaRPr lang="en-US"/>
+            <a:r>
+              <a:rPr lang="en-US" dirty="0"/>
+              <a:t>In order to investigate the relationship between analysis pipeline and clustering results the authors will build out a two step pipeline with modular components. The first step will represent the preprocessing that is typically done on gene expression data. Clustering will be housed in the second step module.</a:t>
+            </a:r>
+            <a:endParaRPr lang="en-US" dirty="0"/>
           </a:p>
         </p:txBody>
       </p:sp>
@@ -4160,7 +4597,17 @@
           <a:bodyPr/>
           <a:lstStyle/>
           <a:p>
-            <a:endParaRPr lang="en-US"/>
+            <a:r>
+              <a:rPr lang="en-US" dirty="0"/>
+              <a:t>For the preprocessing module we would like to implement at least two methods:</a:t>
+            </a:r>
+          </a:p>
+          <a:p>
+            <a:r>
+              <a:rPr lang="en-US" dirty="0"/>
+              <a:t>Individual Data Set Normalization Joint Data Set Normalization</a:t>
+            </a:r>
+            <a:endParaRPr lang="en-US" dirty="0"/>
           </a:p>
         </p:txBody>
       </p:sp>
@@ -4232,7 +4679,23 @@
           <a:bodyPr/>
           <a:lstStyle/>
           <a:p>
-            <a:endParaRPr lang="en-US"/>
+            <a:r>
+              <a:rPr lang="en-US" dirty="0"/>
+              <a:t>For the clustering module we would like to investigate three different methods: Hierarchical Clustering</a:t>
+            </a:r>
+          </a:p>
+          <a:p>
+            <a:r>
+              <a:rPr lang="en-US" dirty="0"/>
+              <a:t>K-Means Clustering</a:t>
+            </a:r>
+          </a:p>
+          <a:p>
+            <a:r>
+              <a:rPr lang="en-US" dirty="0"/>
+              <a:t>EM Clustering</a:t>
+            </a:r>
+            <a:endParaRPr lang="en-US" dirty="0"/>
           </a:p>
         </p:txBody>
       </p:sp>

</xml_diff>

<commit_message>
Revert "Updated Project Presentation"
This reverts commit bbd774717a6fe6987785fa050884ce2fb8f741f7.
</commit_message>
<xml_diff>
--- a/ProjectPresentation.pptx
+++ b/ProjectPresentation.pptx
@@ -4,9 +4,6 @@
   <p:sldMasterIdLst>
     <p:sldMasterId id="2147483648" r:id="rId1"/>
   </p:sldMasterIdLst>
-  <p:notesMasterIdLst>
-    <p:notesMasterId r:id="rId24"/>
-  </p:notesMasterIdLst>
   <p:sldIdLst>
     <p:sldId id="256" r:id="rId2"/>
     <p:sldId id="259" r:id="rId3"/>
@@ -14,22 +11,20 @@
     <p:sldId id="257" r:id="rId5"/>
     <p:sldId id="258" r:id="rId6"/>
     <p:sldId id="261" r:id="rId7"/>
-    <p:sldId id="277" r:id="rId8"/>
-    <p:sldId id="262" r:id="rId9"/>
-    <p:sldId id="263" r:id="rId10"/>
+    <p:sldId id="262" r:id="rId8"/>
+    <p:sldId id="263" r:id="rId9"/>
+    <p:sldId id="275" r:id="rId10"/>
     <p:sldId id="264" r:id="rId11"/>
     <p:sldId id="272" r:id="rId12"/>
     <p:sldId id="273" r:id="rId13"/>
     <p:sldId id="265" r:id="rId14"/>
-    <p:sldId id="276" r:id="rId15"/>
+    <p:sldId id="266" r:id="rId15"/>
     <p:sldId id="267" r:id="rId16"/>
-    <p:sldId id="278" r:id="rId17"/>
-    <p:sldId id="274" r:id="rId18"/>
-    <p:sldId id="268" r:id="rId19"/>
-    <p:sldId id="279" r:id="rId20"/>
-    <p:sldId id="269" r:id="rId21"/>
-    <p:sldId id="271" r:id="rId22"/>
-    <p:sldId id="270" r:id="rId23"/>
+    <p:sldId id="274" r:id="rId17"/>
+    <p:sldId id="268" r:id="rId18"/>
+    <p:sldId id="269" r:id="rId19"/>
+    <p:sldId id="271" r:id="rId20"/>
+    <p:sldId id="270" r:id="rId21"/>
   </p:sldIdLst>
   <p:sldSz cx="9144000" cy="6858000" type="screen4x3"/>
   <p:notesSz cx="6858000" cy="9144000"/>
@@ -131,1853 +126,6 @@
 </p:presentation>
 </file>
 
-<file path=ppt/notesMasters/notesMaster1.xml><?xml version="1.0" encoding="utf-8"?>
-<p:notesMaster xmlns:a="http://schemas.openxmlformats.org/drawingml/2006/main" xmlns:r="http://schemas.openxmlformats.org/officeDocument/2006/relationships" xmlns:p="http://schemas.openxmlformats.org/presentationml/2006/main">
-  <p:cSld>
-    <p:bg>
-      <p:bgRef idx="1001">
-        <a:schemeClr val="bg1"/>
-      </p:bgRef>
-    </p:bg>
-    <p:spTree>
-      <p:nvGrpSpPr>
-        <p:cNvPr id="1" name=""/>
-        <p:cNvGrpSpPr/>
-        <p:nvPr/>
-      </p:nvGrpSpPr>
-      <p:grpSpPr>
-        <a:xfrm>
-          <a:off x="0" y="0"/>
-          <a:ext cx="0" cy="0"/>
-          <a:chOff x="0" y="0"/>
-          <a:chExt cx="0" cy="0"/>
-        </a:xfrm>
-      </p:grpSpPr>
-      <p:sp>
-        <p:nvSpPr>
-          <p:cNvPr id="2" name="Header Placeholder 1"/>
-          <p:cNvSpPr>
-            <a:spLocks noGrp="1"/>
-          </p:cNvSpPr>
-          <p:nvPr>
-            <p:ph type="hdr" sz="quarter"/>
-          </p:nvPr>
-        </p:nvSpPr>
-        <p:spPr>
-          <a:xfrm>
-            <a:off x="0" y="0"/>
-            <a:ext cx="2971800" cy="457200"/>
-          </a:xfrm>
-          <a:prstGeom prst="rect">
-            <a:avLst/>
-          </a:prstGeom>
-        </p:spPr>
-        <p:txBody>
-          <a:bodyPr vert="horz" lIns="91440" tIns="45720" rIns="91440" bIns="45720" rtlCol="0"/>
-          <a:lstStyle>
-            <a:lvl1pPr algn="l">
-              <a:defRPr sz="1200"/>
-            </a:lvl1pPr>
-          </a:lstStyle>
-          <a:p>
-            <a:endParaRPr lang="en-US"/>
-          </a:p>
-        </p:txBody>
-      </p:sp>
-      <p:sp>
-        <p:nvSpPr>
-          <p:cNvPr id="3" name="Date Placeholder 2"/>
-          <p:cNvSpPr>
-            <a:spLocks noGrp="1"/>
-          </p:cNvSpPr>
-          <p:nvPr>
-            <p:ph type="dt" idx="1"/>
-          </p:nvPr>
-        </p:nvSpPr>
-        <p:spPr>
-          <a:xfrm>
-            <a:off x="3884613" y="0"/>
-            <a:ext cx="2971800" cy="457200"/>
-          </a:xfrm>
-          <a:prstGeom prst="rect">
-            <a:avLst/>
-          </a:prstGeom>
-        </p:spPr>
-        <p:txBody>
-          <a:bodyPr vert="horz" lIns="91440" tIns="45720" rIns="91440" bIns="45720" rtlCol="0"/>
-          <a:lstStyle>
-            <a:lvl1pPr algn="r">
-              <a:defRPr sz="1200"/>
-            </a:lvl1pPr>
-          </a:lstStyle>
-          <a:p>
-            <a:fld id="{07E58FC5-A410-E940-9DD0-A8600FBCB602}" type="datetimeFigureOut">
-              <a:rPr lang="en-US" smtClean="0"/>
-              <a:t>5/6/15</a:t>
-            </a:fld>
-            <a:endParaRPr lang="en-US"/>
-          </a:p>
-        </p:txBody>
-      </p:sp>
-      <p:sp>
-        <p:nvSpPr>
-          <p:cNvPr id="4" name="Slide Image Placeholder 3"/>
-          <p:cNvSpPr>
-            <a:spLocks noGrp="1" noRot="1" noChangeAspect="1"/>
-          </p:cNvSpPr>
-          <p:nvPr>
-            <p:ph type="sldImg" idx="2"/>
-          </p:nvPr>
-        </p:nvSpPr>
-        <p:spPr>
-          <a:xfrm>
-            <a:off x="1143000" y="685800"/>
-            <a:ext cx="4572000" cy="3429000"/>
-          </a:xfrm>
-          <a:prstGeom prst="rect">
-            <a:avLst/>
-          </a:prstGeom>
-          <a:noFill/>
-          <a:ln w="12700">
-            <a:solidFill>
-              <a:prstClr val="black"/>
-            </a:solidFill>
-          </a:ln>
-        </p:spPr>
-        <p:txBody>
-          <a:bodyPr vert="horz" lIns="91440" tIns="45720" rIns="91440" bIns="45720" rtlCol="0" anchor="ctr"/>
-          <a:lstStyle/>
-          <a:p>
-            <a:endParaRPr lang="en-US"/>
-          </a:p>
-        </p:txBody>
-      </p:sp>
-      <p:sp>
-        <p:nvSpPr>
-          <p:cNvPr id="5" name="Notes Placeholder 4"/>
-          <p:cNvSpPr>
-            <a:spLocks noGrp="1"/>
-          </p:cNvSpPr>
-          <p:nvPr>
-            <p:ph type="body" sz="quarter" idx="3"/>
-          </p:nvPr>
-        </p:nvSpPr>
-        <p:spPr>
-          <a:xfrm>
-            <a:off x="685800" y="4343400"/>
-            <a:ext cx="5486400" cy="4114800"/>
-          </a:xfrm>
-          <a:prstGeom prst="rect">
-            <a:avLst/>
-          </a:prstGeom>
-        </p:spPr>
-        <p:txBody>
-          <a:bodyPr vert="horz" lIns="91440" tIns="45720" rIns="91440" bIns="45720" rtlCol="0"/>
-          <a:lstStyle/>
-          <a:p>
-            <a:pPr lvl="0"/>
-            <a:r>
-              <a:rPr lang="en-US" smtClean="0"/>
-              <a:t>Click to edit Master text styles</a:t>
-            </a:r>
-          </a:p>
-          <a:p>
-            <a:pPr lvl="1"/>
-            <a:r>
-              <a:rPr lang="en-US" smtClean="0"/>
-              <a:t>Second level</a:t>
-            </a:r>
-          </a:p>
-          <a:p>
-            <a:pPr lvl="2"/>
-            <a:r>
-              <a:rPr lang="en-US" smtClean="0"/>
-              <a:t>Third level</a:t>
-            </a:r>
-          </a:p>
-          <a:p>
-            <a:pPr lvl="3"/>
-            <a:r>
-              <a:rPr lang="en-US" smtClean="0"/>
-              <a:t>Fourth level</a:t>
-            </a:r>
-          </a:p>
-          <a:p>
-            <a:pPr lvl="4"/>
-            <a:r>
-              <a:rPr lang="en-US" smtClean="0"/>
-              <a:t>Fifth level</a:t>
-            </a:r>
-            <a:endParaRPr lang="en-US"/>
-          </a:p>
-        </p:txBody>
-      </p:sp>
-      <p:sp>
-        <p:nvSpPr>
-          <p:cNvPr id="6" name="Footer Placeholder 5"/>
-          <p:cNvSpPr>
-            <a:spLocks noGrp="1"/>
-          </p:cNvSpPr>
-          <p:nvPr>
-            <p:ph type="ftr" sz="quarter" idx="4"/>
-          </p:nvPr>
-        </p:nvSpPr>
-        <p:spPr>
-          <a:xfrm>
-            <a:off x="0" y="8685213"/>
-            <a:ext cx="2971800" cy="457200"/>
-          </a:xfrm>
-          <a:prstGeom prst="rect">
-            <a:avLst/>
-          </a:prstGeom>
-        </p:spPr>
-        <p:txBody>
-          <a:bodyPr vert="horz" lIns="91440" tIns="45720" rIns="91440" bIns="45720" rtlCol="0" anchor="b"/>
-          <a:lstStyle>
-            <a:lvl1pPr algn="l">
-              <a:defRPr sz="1200"/>
-            </a:lvl1pPr>
-          </a:lstStyle>
-          <a:p>
-            <a:endParaRPr lang="en-US"/>
-          </a:p>
-        </p:txBody>
-      </p:sp>
-      <p:sp>
-        <p:nvSpPr>
-          <p:cNvPr id="7" name="Slide Number Placeholder 6"/>
-          <p:cNvSpPr>
-            <a:spLocks noGrp="1"/>
-          </p:cNvSpPr>
-          <p:nvPr>
-            <p:ph type="sldNum" sz="quarter" idx="5"/>
-          </p:nvPr>
-        </p:nvSpPr>
-        <p:spPr>
-          <a:xfrm>
-            <a:off x="3884613" y="8685213"/>
-            <a:ext cx="2971800" cy="457200"/>
-          </a:xfrm>
-          <a:prstGeom prst="rect">
-            <a:avLst/>
-          </a:prstGeom>
-        </p:spPr>
-        <p:txBody>
-          <a:bodyPr vert="horz" lIns="91440" tIns="45720" rIns="91440" bIns="45720" rtlCol="0" anchor="b"/>
-          <a:lstStyle>
-            <a:lvl1pPr algn="r">
-              <a:defRPr sz="1200"/>
-            </a:lvl1pPr>
-          </a:lstStyle>
-          <a:p>
-            <a:fld id="{1ECD8851-0277-734A-B183-C70A1D731BF2}" type="slidenum">
-              <a:rPr lang="en-US" smtClean="0"/>
-              <a:t>‹#›</a:t>
-            </a:fld>
-            <a:endParaRPr lang="en-US"/>
-          </a:p>
-        </p:txBody>
-      </p:sp>
-    </p:spTree>
-    <p:extLst>
-      <p:ext uri="{BB962C8B-B14F-4D97-AF65-F5344CB8AC3E}">
-        <p14:creationId xmlns:p14="http://schemas.microsoft.com/office/powerpoint/2010/main" val="1770645872"/>
-      </p:ext>
-    </p:extLst>
-  </p:cSld>
-  <p:clrMap bg1="lt1" tx1="dk1" bg2="lt2" tx2="dk2" accent1="accent1" accent2="accent2" accent3="accent3" accent4="accent4" accent5="accent5" accent6="accent6" hlink="hlink" folHlink="folHlink"/>
-  <p:notesStyle>
-    <a:lvl1pPr marL="0" algn="l" defTabSz="457200" rtl="0" eaLnBrk="1" latinLnBrk="0" hangingPunct="1">
-      <a:defRPr sz="1200" kern="1200">
-        <a:solidFill>
-          <a:schemeClr val="tx1"/>
-        </a:solidFill>
-        <a:latin typeface="+mn-lt"/>
-        <a:ea typeface="+mn-ea"/>
-        <a:cs typeface="+mn-cs"/>
-      </a:defRPr>
-    </a:lvl1pPr>
-    <a:lvl2pPr marL="457200" algn="l" defTabSz="457200" rtl="0" eaLnBrk="1" latinLnBrk="0" hangingPunct="1">
-      <a:defRPr sz="1200" kern="1200">
-        <a:solidFill>
-          <a:schemeClr val="tx1"/>
-        </a:solidFill>
-        <a:latin typeface="+mn-lt"/>
-        <a:ea typeface="+mn-ea"/>
-        <a:cs typeface="+mn-cs"/>
-      </a:defRPr>
-    </a:lvl2pPr>
-    <a:lvl3pPr marL="914400" algn="l" defTabSz="457200" rtl="0" eaLnBrk="1" latinLnBrk="0" hangingPunct="1">
-      <a:defRPr sz="1200" kern="1200">
-        <a:solidFill>
-          <a:schemeClr val="tx1"/>
-        </a:solidFill>
-        <a:latin typeface="+mn-lt"/>
-        <a:ea typeface="+mn-ea"/>
-        <a:cs typeface="+mn-cs"/>
-      </a:defRPr>
-    </a:lvl3pPr>
-    <a:lvl4pPr marL="1371600" algn="l" defTabSz="457200" rtl="0" eaLnBrk="1" latinLnBrk="0" hangingPunct="1">
-      <a:defRPr sz="1200" kern="1200">
-        <a:solidFill>
-          <a:schemeClr val="tx1"/>
-        </a:solidFill>
-        <a:latin typeface="+mn-lt"/>
-        <a:ea typeface="+mn-ea"/>
-        <a:cs typeface="+mn-cs"/>
-      </a:defRPr>
-    </a:lvl4pPr>
-    <a:lvl5pPr marL="1828800" algn="l" defTabSz="457200" rtl="0" eaLnBrk="1" latinLnBrk="0" hangingPunct="1">
-      <a:defRPr sz="1200" kern="1200">
-        <a:solidFill>
-          <a:schemeClr val="tx1"/>
-        </a:solidFill>
-        <a:latin typeface="+mn-lt"/>
-        <a:ea typeface="+mn-ea"/>
-        <a:cs typeface="+mn-cs"/>
-      </a:defRPr>
-    </a:lvl5pPr>
-    <a:lvl6pPr marL="2286000" algn="l" defTabSz="457200" rtl="0" eaLnBrk="1" latinLnBrk="0" hangingPunct="1">
-      <a:defRPr sz="1200" kern="1200">
-        <a:solidFill>
-          <a:schemeClr val="tx1"/>
-        </a:solidFill>
-        <a:latin typeface="+mn-lt"/>
-        <a:ea typeface="+mn-ea"/>
-        <a:cs typeface="+mn-cs"/>
-      </a:defRPr>
-    </a:lvl6pPr>
-    <a:lvl7pPr marL="2743200" algn="l" defTabSz="457200" rtl="0" eaLnBrk="1" latinLnBrk="0" hangingPunct="1">
-      <a:defRPr sz="1200" kern="1200">
-        <a:solidFill>
-          <a:schemeClr val="tx1"/>
-        </a:solidFill>
-        <a:latin typeface="+mn-lt"/>
-        <a:ea typeface="+mn-ea"/>
-        <a:cs typeface="+mn-cs"/>
-      </a:defRPr>
-    </a:lvl7pPr>
-    <a:lvl8pPr marL="3200400" algn="l" defTabSz="457200" rtl="0" eaLnBrk="1" latinLnBrk="0" hangingPunct="1">
-      <a:defRPr sz="1200" kern="1200">
-        <a:solidFill>
-          <a:schemeClr val="tx1"/>
-        </a:solidFill>
-        <a:latin typeface="+mn-lt"/>
-        <a:ea typeface="+mn-ea"/>
-        <a:cs typeface="+mn-cs"/>
-      </a:defRPr>
-    </a:lvl8pPr>
-    <a:lvl9pPr marL="3657600" algn="l" defTabSz="457200" rtl="0" eaLnBrk="1" latinLnBrk="0" hangingPunct="1">
-      <a:defRPr sz="1200" kern="1200">
-        <a:solidFill>
-          <a:schemeClr val="tx1"/>
-        </a:solidFill>
-        <a:latin typeface="+mn-lt"/>
-        <a:ea typeface="+mn-ea"/>
-        <a:cs typeface="+mn-cs"/>
-      </a:defRPr>
-    </a:lvl9pPr>
-  </p:notesStyle>
-</p:notesMaster>
-</file>
-
-<file path=ppt/notesSlides/notesSlide1.xml><?xml version="1.0" encoding="utf-8"?>
-<p:notes xmlns:a="http://schemas.openxmlformats.org/drawingml/2006/main" xmlns:r="http://schemas.openxmlformats.org/officeDocument/2006/relationships" xmlns:p="http://schemas.openxmlformats.org/presentationml/2006/main">
-  <p:cSld>
-    <p:spTree>
-      <p:nvGrpSpPr>
-        <p:cNvPr id="1" name=""/>
-        <p:cNvGrpSpPr/>
-        <p:nvPr/>
-      </p:nvGrpSpPr>
-      <p:grpSpPr>
-        <a:xfrm>
-          <a:off x="0" y="0"/>
-          <a:ext cx="0" cy="0"/>
-          <a:chOff x="0" y="0"/>
-          <a:chExt cx="0" cy="0"/>
-        </a:xfrm>
-      </p:grpSpPr>
-      <p:sp>
-        <p:nvSpPr>
-          <p:cNvPr id="2" name="Slide Image Placeholder 1"/>
-          <p:cNvSpPr>
-            <a:spLocks noGrp="1" noRot="1" noChangeAspect="1"/>
-          </p:cNvSpPr>
-          <p:nvPr>
-            <p:ph type="sldImg"/>
-          </p:nvPr>
-        </p:nvSpPr>
-        <p:spPr/>
-      </p:sp>
-      <p:sp>
-        <p:nvSpPr>
-          <p:cNvPr id="3" name="Notes Placeholder 2"/>
-          <p:cNvSpPr>
-            <a:spLocks noGrp="1"/>
-          </p:cNvSpPr>
-          <p:nvPr>
-            <p:ph type="body" idx="1"/>
-          </p:nvPr>
-        </p:nvSpPr>
-        <p:spPr/>
-        <p:txBody>
-          <a:bodyPr/>
-          <a:lstStyle/>
-          <a:p>
-            <a:r>
-              <a:rPr lang="en-US" dirty="0" smtClean="0"/>
-              <a:t>TAYLOR</a:t>
-            </a:r>
-            <a:endParaRPr lang="en-US" dirty="0"/>
-          </a:p>
-        </p:txBody>
-      </p:sp>
-      <p:sp>
-        <p:nvSpPr>
-          <p:cNvPr id="4" name="Slide Number Placeholder 3"/>
-          <p:cNvSpPr>
-            <a:spLocks noGrp="1"/>
-          </p:cNvSpPr>
-          <p:nvPr>
-            <p:ph type="sldNum" sz="quarter" idx="10"/>
-          </p:nvPr>
-        </p:nvSpPr>
-        <p:spPr/>
-        <p:txBody>
-          <a:bodyPr/>
-          <a:lstStyle/>
-          <a:p>
-            <a:fld id="{1ECD8851-0277-734A-B183-C70A1D731BF2}" type="slidenum">
-              <a:rPr lang="en-US" smtClean="0"/>
-              <a:t>4</a:t>
-            </a:fld>
-            <a:endParaRPr lang="en-US"/>
-          </a:p>
-        </p:txBody>
-      </p:sp>
-    </p:spTree>
-    <p:extLst>
-      <p:ext uri="{BB962C8B-B14F-4D97-AF65-F5344CB8AC3E}">
-        <p14:creationId xmlns:p14="http://schemas.microsoft.com/office/powerpoint/2010/main" val="1196438906"/>
-      </p:ext>
-    </p:extLst>
-  </p:cSld>
-  <p:clrMapOvr>
-    <a:masterClrMapping/>
-  </p:clrMapOvr>
-</p:notes>
-</file>
-
-<file path=ppt/notesSlides/notesSlide10.xml><?xml version="1.0" encoding="utf-8"?>
-<p:notes xmlns:a="http://schemas.openxmlformats.org/drawingml/2006/main" xmlns:r="http://schemas.openxmlformats.org/officeDocument/2006/relationships" xmlns:p="http://schemas.openxmlformats.org/presentationml/2006/main">
-  <p:cSld>
-    <p:spTree>
-      <p:nvGrpSpPr>
-        <p:cNvPr id="1" name=""/>
-        <p:cNvGrpSpPr/>
-        <p:nvPr/>
-      </p:nvGrpSpPr>
-      <p:grpSpPr>
-        <a:xfrm>
-          <a:off x="0" y="0"/>
-          <a:ext cx="0" cy="0"/>
-          <a:chOff x="0" y="0"/>
-          <a:chExt cx="0" cy="0"/>
-        </a:xfrm>
-      </p:grpSpPr>
-      <p:sp>
-        <p:nvSpPr>
-          <p:cNvPr id="2" name="Slide Image Placeholder 1"/>
-          <p:cNvSpPr>
-            <a:spLocks noGrp="1" noRot="1" noChangeAspect="1"/>
-          </p:cNvSpPr>
-          <p:nvPr>
-            <p:ph type="sldImg"/>
-          </p:nvPr>
-        </p:nvSpPr>
-        <p:spPr/>
-      </p:sp>
-      <p:sp>
-        <p:nvSpPr>
-          <p:cNvPr id="3" name="Notes Placeholder 2"/>
-          <p:cNvSpPr>
-            <a:spLocks noGrp="1"/>
-          </p:cNvSpPr>
-          <p:nvPr>
-            <p:ph type="body" idx="1"/>
-          </p:nvPr>
-        </p:nvSpPr>
-        <p:spPr/>
-        <p:txBody>
-          <a:bodyPr/>
-          <a:lstStyle/>
-          <a:p>
-            <a:r>
-              <a:rPr lang="en-US" dirty="0" smtClean="0"/>
-              <a:t>ERKIN/TAYLOR</a:t>
-            </a:r>
-          </a:p>
-          <a:p>
-            <a:r>
-              <a:rPr lang="en-US" dirty="0" smtClean="0"/>
-              <a:t>Do PCA</a:t>
-            </a:r>
-          </a:p>
-          <a:p>
-            <a:r>
-              <a:rPr lang="en-US" dirty="0" smtClean="0"/>
-              <a:t>If norm</a:t>
-            </a:r>
-            <a:r>
-              <a:rPr lang="en-US" baseline="0" dirty="0" smtClean="0"/>
-              <a:t> do it along cancer types</a:t>
-            </a:r>
-          </a:p>
-          <a:p>
-            <a:r>
-              <a:rPr lang="en-US" baseline="0" dirty="0" smtClean="0"/>
-              <a:t>1)Legend – and explain exactly what this is showing</a:t>
-            </a:r>
-          </a:p>
-          <a:p>
-            <a:r>
-              <a:rPr lang="en-US" baseline="0" dirty="0" smtClean="0"/>
-              <a:t>Graph before giving an example of how this could look</a:t>
-            </a:r>
-          </a:p>
-          <a:p>
-            <a:r>
-              <a:rPr lang="en-US" baseline="0" dirty="0" smtClean="0"/>
-              <a:t>2) Raw data separated by source, not tumor type</a:t>
-            </a:r>
-          </a:p>
-          <a:p>
-            <a:r>
-              <a:rPr lang="en-US" baseline="0" dirty="0" smtClean="0"/>
-              <a:t>3) Biases for tumor type if performed on tumor types (</a:t>
-            </a:r>
-            <a:r>
-              <a:rPr lang="en-US" baseline="0" dirty="0" err="1" smtClean="0"/>
-              <a:t>eg</a:t>
-            </a:r>
-            <a:r>
-              <a:rPr lang="en-US" baseline="0" dirty="0" smtClean="0"/>
-              <a:t>. Pair </a:t>
-            </a:r>
-            <a:r>
-              <a:rPr lang="en-US" baseline="0" dirty="0" err="1" smtClean="0"/>
-              <a:t>quantile</a:t>
-            </a:r>
-            <a:r>
-              <a:rPr lang="en-US" baseline="0" dirty="0" smtClean="0"/>
-              <a:t>) more random with </a:t>
-            </a:r>
-            <a:r>
-              <a:rPr lang="en-US" baseline="0" dirty="0" err="1" smtClean="0"/>
-              <a:t>quantile</a:t>
-            </a:r>
-            <a:r>
-              <a:rPr lang="en-US" baseline="0" dirty="0" smtClean="0"/>
-              <a:t> and z-score (all 4 or individually performed respectively)</a:t>
-            </a:r>
-          </a:p>
-          <a:p>
-            <a:r>
-              <a:rPr lang="en-US" baseline="0" dirty="0" smtClean="0"/>
-              <a:t>4) PC2 for raw data splits based on source PC2 for Pair </a:t>
-            </a:r>
-            <a:r>
-              <a:rPr lang="en-US" baseline="0" dirty="0" err="1" smtClean="0"/>
-              <a:t>Quantile</a:t>
-            </a:r>
-            <a:r>
-              <a:rPr lang="en-US" baseline="0" dirty="0" smtClean="0"/>
-              <a:t> splits based on cancer type. Kind of an internal control</a:t>
-            </a:r>
-          </a:p>
-          <a:p>
-            <a:endParaRPr lang="en-US" baseline="0" dirty="0" smtClean="0"/>
-          </a:p>
-          <a:p>
-            <a:endParaRPr lang="en-US" baseline="0" dirty="0" smtClean="0"/>
-          </a:p>
-          <a:p>
-            <a:endParaRPr lang="en-US" baseline="0" dirty="0" smtClean="0"/>
-          </a:p>
-          <a:p>
-            <a:endParaRPr lang="en-US" dirty="0" smtClean="0"/>
-          </a:p>
-        </p:txBody>
-      </p:sp>
-      <p:sp>
-        <p:nvSpPr>
-          <p:cNvPr id="4" name="Slide Number Placeholder 3"/>
-          <p:cNvSpPr>
-            <a:spLocks noGrp="1"/>
-          </p:cNvSpPr>
-          <p:nvPr>
-            <p:ph type="sldNum" sz="quarter" idx="10"/>
-          </p:nvPr>
-        </p:nvSpPr>
-        <p:spPr/>
-        <p:txBody>
-          <a:bodyPr/>
-          <a:lstStyle/>
-          <a:p>
-            <a:fld id="{1ECD8851-0277-734A-B183-C70A1D731BF2}" type="slidenum">
-              <a:rPr lang="en-US" smtClean="0"/>
-              <a:t>14</a:t>
-            </a:fld>
-            <a:endParaRPr lang="en-US"/>
-          </a:p>
-        </p:txBody>
-      </p:sp>
-    </p:spTree>
-    <p:extLst>
-      <p:ext uri="{BB962C8B-B14F-4D97-AF65-F5344CB8AC3E}">
-        <p14:creationId xmlns:p14="http://schemas.microsoft.com/office/powerpoint/2010/main" val="2986985564"/>
-      </p:ext>
-    </p:extLst>
-  </p:cSld>
-  <p:clrMapOvr>
-    <a:masterClrMapping/>
-  </p:clrMapOvr>
-</p:notes>
-</file>
-
-<file path=ppt/notesSlides/notesSlide11.xml><?xml version="1.0" encoding="utf-8"?>
-<p:notes xmlns:a="http://schemas.openxmlformats.org/drawingml/2006/main" xmlns:r="http://schemas.openxmlformats.org/officeDocument/2006/relationships" xmlns:p="http://schemas.openxmlformats.org/presentationml/2006/main">
-  <p:cSld>
-    <p:spTree>
-      <p:nvGrpSpPr>
-        <p:cNvPr id="1" name=""/>
-        <p:cNvGrpSpPr/>
-        <p:nvPr/>
-      </p:nvGrpSpPr>
-      <p:grpSpPr>
-        <a:xfrm>
-          <a:off x="0" y="0"/>
-          <a:ext cx="0" cy="0"/>
-          <a:chOff x="0" y="0"/>
-          <a:chExt cx="0" cy="0"/>
-        </a:xfrm>
-      </p:grpSpPr>
-      <p:sp>
-        <p:nvSpPr>
-          <p:cNvPr id="2" name="Slide Image Placeholder 1"/>
-          <p:cNvSpPr>
-            <a:spLocks noGrp="1" noRot="1" noChangeAspect="1"/>
-          </p:cNvSpPr>
-          <p:nvPr>
-            <p:ph type="sldImg"/>
-          </p:nvPr>
-        </p:nvSpPr>
-        <p:spPr/>
-      </p:sp>
-      <p:sp>
-        <p:nvSpPr>
-          <p:cNvPr id="3" name="Notes Placeholder 2"/>
-          <p:cNvSpPr>
-            <a:spLocks noGrp="1"/>
-          </p:cNvSpPr>
-          <p:nvPr>
-            <p:ph type="body" idx="1"/>
-          </p:nvPr>
-        </p:nvSpPr>
-        <p:spPr/>
-        <p:txBody>
-          <a:bodyPr/>
-          <a:lstStyle/>
-          <a:p>
-            <a:r>
-              <a:rPr lang="en-US" dirty="0" smtClean="0"/>
-              <a:t>ERKIN</a:t>
-            </a:r>
-            <a:endParaRPr lang="en-US" dirty="0"/>
-          </a:p>
-        </p:txBody>
-      </p:sp>
-      <p:sp>
-        <p:nvSpPr>
-          <p:cNvPr id="4" name="Slide Number Placeholder 3"/>
-          <p:cNvSpPr>
-            <a:spLocks noGrp="1"/>
-          </p:cNvSpPr>
-          <p:nvPr>
-            <p:ph type="sldNum" sz="quarter" idx="10"/>
-          </p:nvPr>
-        </p:nvSpPr>
-        <p:spPr/>
-        <p:txBody>
-          <a:bodyPr/>
-          <a:lstStyle/>
-          <a:p>
-            <a:fld id="{1ECD8851-0277-734A-B183-C70A1D731BF2}" type="slidenum">
-              <a:rPr lang="en-US" smtClean="0"/>
-              <a:t>15</a:t>
-            </a:fld>
-            <a:endParaRPr lang="en-US"/>
-          </a:p>
-        </p:txBody>
-      </p:sp>
-    </p:spTree>
-    <p:extLst>
-      <p:ext uri="{BB962C8B-B14F-4D97-AF65-F5344CB8AC3E}">
-        <p14:creationId xmlns:p14="http://schemas.microsoft.com/office/powerpoint/2010/main" val="2457740733"/>
-      </p:ext>
-    </p:extLst>
-  </p:cSld>
-  <p:clrMapOvr>
-    <a:masterClrMapping/>
-  </p:clrMapOvr>
-</p:notes>
-</file>
-
-<file path=ppt/notesSlides/notesSlide12.xml><?xml version="1.0" encoding="utf-8"?>
-<p:notes xmlns:a="http://schemas.openxmlformats.org/drawingml/2006/main" xmlns:r="http://schemas.openxmlformats.org/officeDocument/2006/relationships" xmlns:p="http://schemas.openxmlformats.org/presentationml/2006/main">
-  <p:cSld>
-    <p:spTree>
-      <p:nvGrpSpPr>
-        <p:cNvPr id="1" name=""/>
-        <p:cNvGrpSpPr/>
-        <p:nvPr/>
-      </p:nvGrpSpPr>
-      <p:grpSpPr>
-        <a:xfrm>
-          <a:off x="0" y="0"/>
-          <a:ext cx="0" cy="0"/>
-          <a:chOff x="0" y="0"/>
-          <a:chExt cx="0" cy="0"/>
-        </a:xfrm>
-      </p:grpSpPr>
-      <p:sp>
-        <p:nvSpPr>
-          <p:cNvPr id="2" name="Slide Image Placeholder 1"/>
-          <p:cNvSpPr>
-            <a:spLocks noGrp="1" noRot="1" noChangeAspect="1"/>
-          </p:cNvSpPr>
-          <p:nvPr>
-            <p:ph type="sldImg"/>
-          </p:nvPr>
-        </p:nvSpPr>
-        <p:spPr/>
-      </p:sp>
-      <p:sp>
-        <p:nvSpPr>
-          <p:cNvPr id="3" name="Notes Placeholder 2"/>
-          <p:cNvSpPr>
-            <a:spLocks noGrp="1"/>
-          </p:cNvSpPr>
-          <p:nvPr>
-            <p:ph type="body" idx="1"/>
-          </p:nvPr>
-        </p:nvSpPr>
-        <p:spPr/>
-        <p:txBody>
-          <a:bodyPr/>
-          <a:lstStyle/>
-          <a:p>
-            <a:r>
-              <a:rPr lang="en-US" dirty="0" smtClean="0"/>
-              <a:t>LIU</a:t>
-            </a:r>
-            <a:endParaRPr lang="en-US" dirty="0"/>
-          </a:p>
-        </p:txBody>
-      </p:sp>
-      <p:sp>
-        <p:nvSpPr>
-          <p:cNvPr id="4" name="Slide Number Placeholder 3"/>
-          <p:cNvSpPr>
-            <a:spLocks noGrp="1"/>
-          </p:cNvSpPr>
-          <p:nvPr>
-            <p:ph type="sldNum" sz="quarter" idx="10"/>
-          </p:nvPr>
-        </p:nvSpPr>
-        <p:spPr/>
-        <p:txBody>
-          <a:bodyPr/>
-          <a:lstStyle/>
-          <a:p>
-            <a:fld id="{1ECD8851-0277-734A-B183-C70A1D731BF2}" type="slidenum">
-              <a:rPr lang="en-US" smtClean="0"/>
-              <a:t>16</a:t>
-            </a:fld>
-            <a:endParaRPr lang="en-US"/>
-          </a:p>
-        </p:txBody>
-      </p:sp>
-    </p:spTree>
-    <p:extLst>
-      <p:ext uri="{BB962C8B-B14F-4D97-AF65-F5344CB8AC3E}">
-        <p14:creationId xmlns:p14="http://schemas.microsoft.com/office/powerpoint/2010/main" val="2623485886"/>
-      </p:ext>
-    </p:extLst>
-  </p:cSld>
-  <p:clrMapOvr>
-    <a:masterClrMapping/>
-  </p:clrMapOvr>
-</p:notes>
-</file>
-
-<file path=ppt/notesSlides/notesSlide13.xml><?xml version="1.0" encoding="utf-8"?>
-<p:notes xmlns:a="http://schemas.openxmlformats.org/drawingml/2006/main" xmlns:r="http://schemas.openxmlformats.org/officeDocument/2006/relationships" xmlns:p="http://schemas.openxmlformats.org/presentationml/2006/main">
-  <p:cSld>
-    <p:spTree>
-      <p:nvGrpSpPr>
-        <p:cNvPr id="1" name=""/>
-        <p:cNvGrpSpPr/>
-        <p:nvPr/>
-      </p:nvGrpSpPr>
-      <p:grpSpPr>
-        <a:xfrm>
-          <a:off x="0" y="0"/>
-          <a:ext cx="0" cy="0"/>
-          <a:chOff x="0" y="0"/>
-          <a:chExt cx="0" cy="0"/>
-        </a:xfrm>
-      </p:grpSpPr>
-      <p:sp>
-        <p:nvSpPr>
-          <p:cNvPr id="2" name="Slide Image Placeholder 1"/>
-          <p:cNvSpPr>
-            <a:spLocks noGrp="1" noRot="1" noChangeAspect="1"/>
-          </p:cNvSpPr>
-          <p:nvPr>
-            <p:ph type="sldImg"/>
-          </p:nvPr>
-        </p:nvSpPr>
-        <p:spPr/>
-      </p:sp>
-      <p:sp>
-        <p:nvSpPr>
-          <p:cNvPr id="3" name="Notes Placeholder 2"/>
-          <p:cNvSpPr>
-            <a:spLocks noGrp="1"/>
-          </p:cNvSpPr>
-          <p:nvPr>
-            <p:ph type="body" idx="1"/>
-          </p:nvPr>
-        </p:nvSpPr>
-        <p:spPr/>
-        <p:txBody>
-          <a:bodyPr/>
-          <a:lstStyle/>
-          <a:p>
-            <a:r>
-              <a:rPr lang="en-US" dirty="0" smtClean="0"/>
-              <a:t>ERKIN</a:t>
-            </a:r>
-            <a:endParaRPr lang="en-US" dirty="0"/>
-          </a:p>
-        </p:txBody>
-      </p:sp>
-      <p:sp>
-        <p:nvSpPr>
-          <p:cNvPr id="4" name="Slide Number Placeholder 3"/>
-          <p:cNvSpPr>
-            <a:spLocks noGrp="1"/>
-          </p:cNvSpPr>
-          <p:nvPr>
-            <p:ph type="sldNum" sz="quarter" idx="10"/>
-          </p:nvPr>
-        </p:nvSpPr>
-        <p:spPr/>
-        <p:txBody>
-          <a:bodyPr/>
-          <a:lstStyle/>
-          <a:p>
-            <a:fld id="{1ECD8851-0277-734A-B183-C70A1D731BF2}" type="slidenum">
-              <a:rPr lang="en-US" smtClean="0"/>
-              <a:t>17</a:t>
-            </a:fld>
-            <a:endParaRPr lang="en-US"/>
-          </a:p>
-        </p:txBody>
-      </p:sp>
-    </p:spTree>
-    <p:extLst>
-      <p:ext uri="{BB962C8B-B14F-4D97-AF65-F5344CB8AC3E}">
-        <p14:creationId xmlns:p14="http://schemas.microsoft.com/office/powerpoint/2010/main" val="1639379805"/>
-      </p:ext>
-    </p:extLst>
-  </p:cSld>
-  <p:clrMapOvr>
-    <a:masterClrMapping/>
-  </p:clrMapOvr>
-</p:notes>
-</file>
-
-<file path=ppt/notesSlides/notesSlide14.xml><?xml version="1.0" encoding="utf-8"?>
-<p:notes xmlns:a="http://schemas.openxmlformats.org/drawingml/2006/main" xmlns:r="http://schemas.openxmlformats.org/officeDocument/2006/relationships" xmlns:p="http://schemas.openxmlformats.org/presentationml/2006/main">
-  <p:cSld>
-    <p:spTree>
-      <p:nvGrpSpPr>
-        <p:cNvPr id="1" name=""/>
-        <p:cNvGrpSpPr/>
-        <p:nvPr/>
-      </p:nvGrpSpPr>
-      <p:grpSpPr>
-        <a:xfrm>
-          <a:off x="0" y="0"/>
-          <a:ext cx="0" cy="0"/>
-          <a:chOff x="0" y="0"/>
-          <a:chExt cx="0" cy="0"/>
-        </a:xfrm>
-      </p:grpSpPr>
-      <p:sp>
-        <p:nvSpPr>
-          <p:cNvPr id="2" name="Slide Image Placeholder 1"/>
-          <p:cNvSpPr>
-            <a:spLocks noGrp="1" noRot="1" noChangeAspect="1"/>
-          </p:cNvSpPr>
-          <p:nvPr>
-            <p:ph type="sldImg"/>
-          </p:nvPr>
-        </p:nvSpPr>
-        <p:spPr/>
-      </p:sp>
-      <p:sp>
-        <p:nvSpPr>
-          <p:cNvPr id="3" name="Notes Placeholder 2"/>
-          <p:cNvSpPr>
-            <a:spLocks noGrp="1"/>
-          </p:cNvSpPr>
-          <p:nvPr>
-            <p:ph type="body" idx="1"/>
-          </p:nvPr>
-        </p:nvSpPr>
-        <p:spPr/>
-        <p:txBody>
-          <a:bodyPr/>
-          <a:lstStyle/>
-          <a:p>
-            <a:r>
-              <a:rPr lang="en-US" dirty="0" smtClean="0"/>
-              <a:t>TAYLOR</a:t>
-            </a:r>
-            <a:endParaRPr lang="en-US" dirty="0"/>
-          </a:p>
-        </p:txBody>
-      </p:sp>
-      <p:sp>
-        <p:nvSpPr>
-          <p:cNvPr id="4" name="Slide Number Placeholder 3"/>
-          <p:cNvSpPr>
-            <a:spLocks noGrp="1"/>
-          </p:cNvSpPr>
-          <p:nvPr>
-            <p:ph type="sldNum" sz="quarter" idx="10"/>
-          </p:nvPr>
-        </p:nvSpPr>
-        <p:spPr/>
-        <p:txBody>
-          <a:bodyPr/>
-          <a:lstStyle/>
-          <a:p>
-            <a:fld id="{1ECD8851-0277-734A-B183-C70A1D731BF2}" type="slidenum">
-              <a:rPr lang="en-US" smtClean="0"/>
-              <a:t>19</a:t>
-            </a:fld>
-            <a:endParaRPr lang="en-US"/>
-          </a:p>
-        </p:txBody>
-      </p:sp>
-    </p:spTree>
-    <p:extLst>
-      <p:ext uri="{BB962C8B-B14F-4D97-AF65-F5344CB8AC3E}">
-        <p14:creationId xmlns:p14="http://schemas.microsoft.com/office/powerpoint/2010/main" val="2819095259"/>
-      </p:ext>
-    </p:extLst>
-  </p:cSld>
-  <p:clrMapOvr>
-    <a:masterClrMapping/>
-  </p:clrMapOvr>
-</p:notes>
-</file>
-
-<file path=ppt/notesSlides/notesSlide15.xml><?xml version="1.0" encoding="utf-8"?>
-<p:notes xmlns:a="http://schemas.openxmlformats.org/drawingml/2006/main" xmlns:r="http://schemas.openxmlformats.org/officeDocument/2006/relationships" xmlns:p="http://schemas.openxmlformats.org/presentationml/2006/main">
-  <p:cSld>
-    <p:spTree>
-      <p:nvGrpSpPr>
-        <p:cNvPr id="1" name=""/>
-        <p:cNvGrpSpPr/>
-        <p:nvPr/>
-      </p:nvGrpSpPr>
-      <p:grpSpPr>
-        <a:xfrm>
-          <a:off x="0" y="0"/>
-          <a:ext cx="0" cy="0"/>
-          <a:chOff x="0" y="0"/>
-          <a:chExt cx="0" cy="0"/>
-        </a:xfrm>
-      </p:grpSpPr>
-      <p:sp>
-        <p:nvSpPr>
-          <p:cNvPr id="2" name="Slide Image Placeholder 1"/>
-          <p:cNvSpPr>
-            <a:spLocks noGrp="1" noRot="1" noChangeAspect="1"/>
-          </p:cNvSpPr>
-          <p:nvPr>
-            <p:ph type="sldImg"/>
-          </p:nvPr>
-        </p:nvSpPr>
-        <p:spPr/>
-      </p:sp>
-      <p:sp>
-        <p:nvSpPr>
-          <p:cNvPr id="3" name="Notes Placeholder 2"/>
-          <p:cNvSpPr>
-            <a:spLocks noGrp="1"/>
-          </p:cNvSpPr>
-          <p:nvPr>
-            <p:ph type="body" idx="1"/>
-          </p:nvPr>
-        </p:nvSpPr>
-        <p:spPr/>
-        <p:txBody>
-          <a:bodyPr/>
-          <a:lstStyle/>
-          <a:p>
-            <a:r>
-              <a:rPr lang="en-US" dirty="0" smtClean="0"/>
-              <a:t>LIU</a:t>
-            </a:r>
-            <a:endParaRPr lang="en-US" dirty="0"/>
-          </a:p>
-        </p:txBody>
-      </p:sp>
-      <p:sp>
-        <p:nvSpPr>
-          <p:cNvPr id="4" name="Slide Number Placeholder 3"/>
-          <p:cNvSpPr>
-            <a:spLocks noGrp="1"/>
-          </p:cNvSpPr>
-          <p:nvPr>
-            <p:ph type="sldNum" sz="quarter" idx="10"/>
-          </p:nvPr>
-        </p:nvSpPr>
-        <p:spPr/>
-        <p:txBody>
-          <a:bodyPr/>
-          <a:lstStyle/>
-          <a:p>
-            <a:fld id="{1ECD8851-0277-734A-B183-C70A1D731BF2}" type="slidenum">
-              <a:rPr lang="en-US" smtClean="0"/>
-              <a:t>20</a:t>
-            </a:fld>
-            <a:endParaRPr lang="en-US"/>
-          </a:p>
-        </p:txBody>
-      </p:sp>
-    </p:spTree>
-    <p:extLst>
-      <p:ext uri="{BB962C8B-B14F-4D97-AF65-F5344CB8AC3E}">
-        <p14:creationId xmlns:p14="http://schemas.microsoft.com/office/powerpoint/2010/main" val="435598231"/>
-      </p:ext>
-    </p:extLst>
-  </p:cSld>
-  <p:clrMapOvr>
-    <a:masterClrMapping/>
-  </p:clrMapOvr>
-</p:notes>
-</file>
-
-<file path=ppt/notesSlides/notesSlide16.xml><?xml version="1.0" encoding="utf-8"?>
-<p:notes xmlns:a="http://schemas.openxmlformats.org/drawingml/2006/main" xmlns:r="http://schemas.openxmlformats.org/officeDocument/2006/relationships" xmlns:p="http://schemas.openxmlformats.org/presentationml/2006/main">
-  <p:cSld>
-    <p:spTree>
-      <p:nvGrpSpPr>
-        <p:cNvPr id="1" name=""/>
-        <p:cNvGrpSpPr/>
-        <p:nvPr/>
-      </p:nvGrpSpPr>
-      <p:grpSpPr>
-        <a:xfrm>
-          <a:off x="0" y="0"/>
-          <a:ext cx="0" cy="0"/>
-          <a:chOff x="0" y="0"/>
-          <a:chExt cx="0" cy="0"/>
-        </a:xfrm>
-      </p:grpSpPr>
-      <p:sp>
-        <p:nvSpPr>
-          <p:cNvPr id="2" name="Slide Image Placeholder 1"/>
-          <p:cNvSpPr>
-            <a:spLocks noGrp="1" noRot="1" noChangeAspect="1"/>
-          </p:cNvSpPr>
-          <p:nvPr>
-            <p:ph type="sldImg"/>
-          </p:nvPr>
-        </p:nvSpPr>
-        <p:spPr/>
-      </p:sp>
-      <p:sp>
-        <p:nvSpPr>
-          <p:cNvPr id="3" name="Notes Placeholder 2"/>
-          <p:cNvSpPr>
-            <a:spLocks noGrp="1"/>
-          </p:cNvSpPr>
-          <p:nvPr>
-            <p:ph type="body" idx="1"/>
-          </p:nvPr>
-        </p:nvSpPr>
-        <p:spPr/>
-        <p:txBody>
-          <a:bodyPr/>
-          <a:lstStyle/>
-          <a:p>
-            <a:r>
-              <a:rPr lang="en-US" smtClean="0"/>
-              <a:t>ERKIN</a:t>
-            </a:r>
-            <a:endParaRPr lang="en-US"/>
-          </a:p>
-        </p:txBody>
-      </p:sp>
-      <p:sp>
-        <p:nvSpPr>
-          <p:cNvPr id="4" name="Slide Number Placeholder 3"/>
-          <p:cNvSpPr>
-            <a:spLocks noGrp="1"/>
-          </p:cNvSpPr>
-          <p:nvPr>
-            <p:ph type="sldNum" sz="quarter" idx="10"/>
-          </p:nvPr>
-        </p:nvSpPr>
-        <p:spPr/>
-        <p:txBody>
-          <a:bodyPr/>
-          <a:lstStyle/>
-          <a:p>
-            <a:fld id="{1ECD8851-0277-734A-B183-C70A1D731BF2}" type="slidenum">
-              <a:rPr lang="en-US" smtClean="0"/>
-              <a:t>21</a:t>
-            </a:fld>
-            <a:endParaRPr lang="en-US"/>
-          </a:p>
-        </p:txBody>
-      </p:sp>
-    </p:spTree>
-    <p:extLst>
-      <p:ext uri="{BB962C8B-B14F-4D97-AF65-F5344CB8AC3E}">
-        <p14:creationId xmlns:p14="http://schemas.microsoft.com/office/powerpoint/2010/main" val="3608672225"/>
-      </p:ext>
-    </p:extLst>
-  </p:cSld>
-  <p:clrMapOvr>
-    <a:masterClrMapping/>
-  </p:clrMapOvr>
-</p:notes>
-</file>
-
-<file path=ppt/notesSlides/notesSlide2.xml><?xml version="1.0" encoding="utf-8"?>
-<p:notes xmlns:a="http://schemas.openxmlformats.org/drawingml/2006/main" xmlns:r="http://schemas.openxmlformats.org/officeDocument/2006/relationships" xmlns:p="http://schemas.openxmlformats.org/presentationml/2006/main">
-  <p:cSld>
-    <p:spTree>
-      <p:nvGrpSpPr>
-        <p:cNvPr id="1" name=""/>
-        <p:cNvGrpSpPr/>
-        <p:nvPr/>
-      </p:nvGrpSpPr>
-      <p:grpSpPr>
-        <a:xfrm>
-          <a:off x="0" y="0"/>
-          <a:ext cx="0" cy="0"/>
-          <a:chOff x="0" y="0"/>
-          <a:chExt cx="0" cy="0"/>
-        </a:xfrm>
-      </p:grpSpPr>
-      <p:sp>
-        <p:nvSpPr>
-          <p:cNvPr id="2" name="Slide Image Placeholder 1"/>
-          <p:cNvSpPr>
-            <a:spLocks noGrp="1" noRot="1" noChangeAspect="1"/>
-          </p:cNvSpPr>
-          <p:nvPr>
-            <p:ph type="sldImg"/>
-          </p:nvPr>
-        </p:nvSpPr>
-        <p:spPr/>
-      </p:sp>
-      <p:sp>
-        <p:nvSpPr>
-          <p:cNvPr id="3" name="Notes Placeholder 2"/>
-          <p:cNvSpPr>
-            <a:spLocks noGrp="1"/>
-          </p:cNvSpPr>
-          <p:nvPr>
-            <p:ph type="body" idx="1"/>
-          </p:nvPr>
-        </p:nvSpPr>
-        <p:spPr/>
-        <p:txBody>
-          <a:bodyPr/>
-          <a:lstStyle/>
-          <a:p>
-            <a:r>
-              <a:rPr lang="en-US" dirty="0" smtClean="0"/>
-              <a:t>TAYLOR</a:t>
-            </a:r>
-            <a:endParaRPr lang="en-US" dirty="0"/>
-          </a:p>
-        </p:txBody>
-      </p:sp>
-      <p:sp>
-        <p:nvSpPr>
-          <p:cNvPr id="4" name="Slide Number Placeholder 3"/>
-          <p:cNvSpPr>
-            <a:spLocks noGrp="1"/>
-          </p:cNvSpPr>
-          <p:nvPr>
-            <p:ph type="sldNum" sz="quarter" idx="10"/>
-          </p:nvPr>
-        </p:nvSpPr>
-        <p:spPr/>
-        <p:txBody>
-          <a:bodyPr/>
-          <a:lstStyle/>
-          <a:p>
-            <a:fld id="{1ECD8851-0277-734A-B183-C70A1D731BF2}" type="slidenum">
-              <a:rPr lang="en-US" smtClean="0"/>
-              <a:t>5</a:t>
-            </a:fld>
-            <a:endParaRPr lang="en-US"/>
-          </a:p>
-        </p:txBody>
-      </p:sp>
-    </p:spTree>
-    <p:extLst>
-      <p:ext uri="{BB962C8B-B14F-4D97-AF65-F5344CB8AC3E}">
-        <p14:creationId xmlns:p14="http://schemas.microsoft.com/office/powerpoint/2010/main" val="4022090999"/>
-      </p:ext>
-    </p:extLst>
-  </p:cSld>
-  <p:clrMapOvr>
-    <a:masterClrMapping/>
-  </p:clrMapOvr>
-</p:notes>
-</file>
-
-<file path=ppt/notesSlides/notesSlide3.xml><?xml version="1.0" encoding="utf-8"?>
-<p:notes xmlns:a="http://schemas.openxmlformats.org/drawingml/2006/main" xmlns:r="http://schemas.openxmlformats.org/officeDocument/2006/relationships" xmlns:p="http://schemas.openxmlformats.org/presentationml/2006/main">
-  <p:cSld>
-    <p:spTree>
-      <p:nvGrpSpPr>
-        <p:cNvPr id="1" name=""/>
-        <p:cNvGrpSpPr/>
-        <p:nvPr/>
-      </p:nvGrpSpPr>
-      <p:grpSpPr>
-        <a:xfrm>
-          <a:off x="0" y="0"/>
-          <a:ext cx="0" cy="0"/>
-          <a:chOff x="0" y="0"/>
-          <a:chExt cx="0" cy="0"/>
-        </a:xfrm>
-      </p:grpSpPr>
-      <p:sp>
-        <p:nvSpPr>
-          <p:cNvPr id="2" name="Slide Image Placeholder 1"/>
-          <p:cNvSpPr>
-            <a:spLocks noGrp="1" noRot="1" noChangeAspect="1"/>
-          </p:cNvSpPr>
-          <p:nvPr>
-            <p:ph type="sldImg"/>
-          </p:nvPr>
-        </p:nvSpPr>
-        <p:spPr/>
-      </p:sp>
-      <p:sp>
-        <p:nvSpPr>
-          <p:cNvPr id="3" name="Notes Placeholder 2"/>
-          <p:cNvSpPr>
-            <a:spLocks noGrp="1"/>
-          </p:cNvSpPr>
-          <p:nvPr>
-            <p:ph type="body" idx="1"/>
-          </p:nvPr>
-        </p:nvSpPr>
-        <p:spPr/>
-        <p:txBody>
-          <a:bodyPr/>
-          <a:lstStyle/>
-          <a:p>
-            <a:r>
-              <a:rPr lang="en-US" dirty="0" smtClean="0"/>
-              <a:t>TAYLOR</a:t>
-            </a:r>
-            <a:endParaRPr lang="en-US" dirty="0"/>
-          </a:p>
-        </p:txBody>
-      </p:sp>
-      <p:sp>
-        <p:nvSpPr>
-          <p:cNvPr id="4" name="Slide Number Placeholder 3"/>
-          <p:cNvSpPr>
-            <a:spLocks noGrp="1"/>
-          </p:cNvSpPr>
-          <p:nvPr>
-            <p:ph type="sldNum" sz="quarter" idx="10"/>
-          </p:nvPr>
-        </p:nvSpPr>
-        <p:spPr/>
-        <p:txBody>
-          <a:bodyPr/>
-          <a:lstStyle/>
-          <a:p>
-            <a:fld id="{1ECD8851-0277-734A-B183-C70A1D731BF2}" type="slidenum">
-              <a:rPr lang="en-US" smtClean="0"/>
-              <a:t>6</a:t>
-            </a:fld>
-            <a:endParaRPr lang="en-US"/>
-          </a:p>
-        </p:txBody>
-      </p:sp>
-    </p:spTree>
-    <p:extLst>
-      <p:ext uri="{BB962C8B-B14F-4D97-AF65-F5344CB8AC3E}">
-        <p14:creationId xmlns:p14="http://schemas.microsoft.com/office/powerpoint/2010/main" val="399945951"/>
-      </p:ext>
-    </p:extLst>
-  </p:cSld>
-  <p:clrMapOvr>
-    <a:masterClrMapping/>
-  </p:clrMapOvr>
-</p:notes>
-</file>
-
-<file path=ppt/notesSlides/notesSlide4.xml><?xml version="1.0" encoding="utf-8"?>
-<p:notes xmlns:a="http://schemas.openxmlformats.org/drawingml/2006/main" xmlns:r="http://schemas.openxmlformats.org/officeDocument/2006/relationships" xmlns:p="http://schemas.openxmlformats.org/presentationml/2006/main">
-  <p:cSld>
-    <p:spTree>
-      <p:nvGrpSpPr>
-        <p:cNvPr id="1" name=""/>
-        <p:cNvGrpSpPr/>
-        <p:nvPr/>
-      </p:nvGrpSpPr>
-      <p:grpSpPr>
-        <a:xfrm>
-          <a:off x="0" y="0"/>
-          <a:ext cx="0" cy="0"/>
-          <a:chOff x="0" y="0"/>
-          <a:chExt cx="0" cy="0"/>
-        </a:xfrm>
-      </p:grpSpPr>
-      <p:sp>
-        <p:nvSpPr>
-          <p:cNvPr id="2" name="Slide Image Placeholder 1"/>
-          <p:cNvSpPr>
-            <a:spLocks noGrp="1" noRot="1" noChangeAspect="1"/>
-          </p:cNvSpPr>
-          <p:nvPr>
-            <p:ph type="sldImg"/>
-          </p:nvPr>
-        </p:nvSpPr>
-        <p:spPr/>
-      </p:sp>
-      <p:sp>
-        <p:nvSpPr>
-          <p:cNvPr id="3" name="Notes Placeholder 2"/>
-          <p:cNvSpPr>
-            <a:spLocks noGrp="1"/>
-          </p:cNvSpPr>
-          <p:nvPr>
-            <p:ph type="body" idx="1"/>
-          </p:nvPr>
-        </p:nvSpPr>
-        <p:spPr/>
-        <p:txBody>
-          <a:bodyPr/>
-          <a:lstStyle/>
-          <a:p>
-            <a:r>
-              <a:rPr lang="en-US" dirty="0" smtClean="0"/>
-              <a:t>ERKIN</a:t>
-            </a:r>
-            <a:endParaRPr lang="en-US" dirty="0"/>
-          </a:p>
-        </p:txBody>
-      </p:sp>
-      <p:sp>
-        <p:nvSpPr>
-          <p:cNvPr id="4" name="Slide Number Placeholder 3"/>
-          <p:cNvSpPr>
-            <a:spLocks noGrp="1"/>
-          </p:cNvSpPr>
-          <p:nvPr>
-            <p:ph type="sldNum" sz="quarter" idx="10"/>
-          </p:nvPr>
-        </p:nvSpPr>
-        <p:spPr/>
-        <p:txBody>
-          <a:bodyPr/>
-          <a:lstStyle/>
-          <a:p>
-            <a:fld id="{1ECD8851-0277-734A-B183-C70A1D731BF2}" type="slidenum">
-              <a:rPr lang="en-US" smtClean="0"/>
-              <a:t>7</a:t>
-            </a:fld>
-            <a:endParaRPr lang="en-US"/>
-          </a:p>
-        </p:txBody>
-      </p:sp>
-    </p:spTree>
-    <p:extLst>
-      <p:ext uri="{BB962C8B-B14F-4D97-AF65-F5344CB8AC3E}">
-        <p14:creationId xmlns:p14="http://schemas.microsoft.com/office/powerpoint/2010/main" val="1818024923"/>
-      </p:ext>
-    </p:extLst>
-  </p:cSld>
-  <p:clrMapOvr>
-    <a:masterClrMapping/>
-  </p:clrMapOvr>
-</p:notes>
-</file>
-
-<file path=ppt/notesSlides/notesSlide5.xml><?xml version="1.0" encoding="utf-8"?>
-<p:notes xmlns:a="http://schemas.openxmlformats.org/drawingml/2006/main" xmlns:r="http://schemas.openxmlformats.org/officeDocument/2006/relationships" xmlns:p="http://schemas.openxmlformats.org/presentationml/2006/main">
-  <p:cSld>
-    <p:spTree>
-      <p:nvGrpSpPr>
-        <p:cNvPr id="1" name=""/>
-        <p:cNvGrpSpPr/>
-        <p:nvPr/>
-      </p:nvGrpSpPr>
-      <p:grpSpPr>
-        <a:xfrm>
-          <a:off x="0" y="0"/>
-          <a:ext cx="0" cy="0"/>
-          <a:chOff x="0" y="0"/>
-          <a:chExt cx="0" cy="0"/>
-        </a:xfrm>
-      </p:grpSpPr>
-      <p:sp>
-        <p:nvSpPr>
-          <p:cNvPr id="2" name="Slide Image Placeholder 1"/>
-          <p:cNvSpPr>
-            <a:spLocks noGrp="1" noRot="1" noChangeAspect="1"/>
-          </p:cNvSpPr>
-          <p:nvPr>
-            <p:ph type="sldImg"/>
-          </p:nvPr>
-        </p:nvSpPr>
-        <p:spPr/>
-      </p:sp>
-      <p:sp>
-        <p:nvSpPr>
-          <p:cNvPr id="3" name="Notes Placeholder 2"/>
-          <p:cNvSpPr>
-            <a:spLocks noGrp="1"/>
-          </p:cNvSpPr>
-          <p:nvPr>
-            <p:ph type="body" idx="1"/>
-          </p:nvPr>
-        </p:nvSpPr>
-        <p:spPr/>
-        <p:txBody>
-          <a:bodyPr/>
-          <a:lstStyle/>
-          <a:p>
-            <a:r>
-              <a:rPr lang="en-US" dirty="0" smtClean="0"/>
-              <a:t>ERKIN</a:t>
-            </a:r>
-            <a:endParaRPr lang="en-US" dirty="0"/>
-          </a:p>
-        </p:txBody>
-      </p:sp>
-      <p:sp>
-        <p:nvSpPr>
-          <p:cNvPr id="4" name="Slide Number Placeholder 3"/>
-          <p:cNvSpPr>
-            <a:spLocks noGrp="1"/>
-          </p:cNvSpPr>
-          <p:nvPr>
-            <p:ph type="sldNum" sz="quarter" idx="10"/>
-          </p:nvPr>
-        </p:nvSpPr>
-        <p:spPr/>
-        <p:txBody>
-          <a:bodyPr/>
-          <a:lstStyle/>
-          <a:p>
-            <a:fld id="{1ECD8851-0277-734A-B183-C70A1D731BF2}" type="slidenum">
-              <a:rPr lang="en-US" smtClean="0"/>
-              <a:t>8</a:t>
-            </a:fld>
-            <a:endParaRPr lang="en-US"/>
-          </a:p>
-        </p:txBody>
-      </p:sp>
-    </p:spTree>
-    <p:extLst>
-      <p:ext uri="{BB962C8B-B14F-4D97-AF65-F5344CB8AC3E}">
-        <p14:creationId xmlns:p14="http://schemas.microsoft.com/office/powerpoint/2010/main" val="24209809"/>
-      </p:ext>
-    </p:extLst>
-  </p:cSld>
-  <p:clrMapOvr>
-    <a:masterClrMapping/>
-  </p:clrMapOvr>
-</p:notes>
-</file>
-
-<file path=ppt/notesSlides/notesSlide6.xml><?xml version="1.0" encoding="utf-8"?>
-<p:notes xmlns:a="http://schemas.openxmlformats.org/drawingml/2006/main" xmlns:r="http://schemas.openxmlformats.org/officeDocument/2006/relationships" xmlns:p="http://schemas.openxmlformats.org/presentationml/2006/main">
-  <p:cSld>
-    <p:spTree>
-      <p:nvGrpSpPr>
-        <p:cNvPr id="1" name=""/>
-        <p:cNvGrpSpPr/>
-        <p:nvPr/>
-      </p:nvGrpSpPr>
-      <p:grpSpPr>
-        <a:xfrm>
-          <a:off x="0" y="0"/>
-          <a:ext cx="0" cy="0"/>
-          <a:chOff x="0" y="0"/>
-          <a:chExt cx="0" cy="0"/>
-        </a:xfrm>
-      </p:grpSpPr>
-      <p:sp>
-        <p:nvSpPr>
-          <p:cNvPr id="2" name="Slide Image Placeholder 1"/>
-          <p:cNvSpPr>
-            <a:spLocks noGrp="1" noRot="1" noChangeAspect="1"/>
-          </p:cNvSpPr>
-          <p:nvPr>
-            <p:ph type="sldImg"/>
-          </p:nvPr>
-        </p:nvSpPr>
-        <p:spPr/>
-      </p:sp>
-      <p:sp>
-        <p:nvSpPr>
-          <p:cNvPr id="3" name="Notes Placeholder 2"/>
-          <p:cNvSpPr>
-            <a:spLocks noGrp="1"/>
-          </p:cNvSpPr>
-          <p:nvPr>
-            <p:ph type="body" idx="1"/>
-          </p:nvPr>
-        </p:nvSpPr>
-        <p:spPr/>
-        <p:txBody>
-          <a:bodyPr/>
-          <a:lstStyle/>
-          <a:p>
-            <a:r>
-              <a:rPr lang="en-US" dirty="0" smtClean="0"/>
-              <a:t>ERKIN</a:t>
-            </a:r>
-            <a:endParaRPr lang="en-US" dirty="0"/>
-          </a:p>
-        </p:txBody>
-      </p:sp>
-      <p:sp>
-        <p:nvSpPr>
-          <p:cNvPr id="4" name="Slide Number Placeholder 3"/>
-          <p:cNvSpPr>
-            <a:spLocks noGrp="1"/>
-          </p:cNvSpPr>
-          <p:nvPr>
-            <p:ph type="sldNum" sz="quarter" idx="10"/>
-          </p:nvPr>
-        </p:nvSpPr>
-        <p:spPr/>
-        <p:txBody>
-          <a:bodyPr/>
-          <a:lstStyle/>
-          <a:p>
-            <a:fld id="{1ECD8851-0277-734A-B183-C70A1D731BF2}" type="slidenum">
-              <a:rPr lang="en-US" smtClean="0"/>
-              <a:t>9</a:t>
-            </a:fld>
-            <a:endParaRPr lang="en-US"/>
-          </a:p>
-        </p:txBody>
-      </p:sp>
-    </p:spTree>
-    <p:extLst>
-      <p:ext uri="{BB962C8B-B14F-4D97-AF65-F5344CB8AC3E}">
-        <p14:creationId xmlns:p14="http://schemas.microsoft.com/office/powerpoint/2010/main" val="3892007511"/>
-      </p:ext>
-    </p:extLst>
-  </p:cSld>
-  <p:clrMapOvr>
-    <a:masterClrMapping/>
-  </p:clrMapOvr>
-</p:notes>
-</file>
-
-<file path=ppt/notesSlides/notesSlide7.xml><?xml version="1.0" encoding="utf-8"?>
-<p:notes xmlns:a="http://schemas.openxmlformats.org/drawingml/2006/main" xmlns:r="http://schemas.openxmlformats.org/officeDocument/2006/relationships" xmlns:p="http://schemas.openxmlformats.org/presentationml/2006/main">
-  <p:cSld>
-    <p:spTree>
-      <p:nvGrpSpPr>
-        <p:cNvPr id="1" name=""/>
-        <p:cNvGrpSpPr/>
-        <p:nvPr/>
-      </p:nvGrpSpPr>
-      <p:grpSpPr>
-        <a:xfrm>
-          <a:off x="0" y="0"/>
-          <a:ext cx="0" cy="0"/>
-          <a:chOff x="0" y="0"/>
-          <a:chExt cx="0" cy="0"/>
-        </a:xfrm>
-      </p:grpSpPr>
-      <p:sp>
-        <p:nvSpPr>
-          <p:cNvPr id="2" name="Slide Image Placeholder 1"/>
-          <p:cNvSpPr>
-            <a:spLocks noGrp="1" noRot="1" noChangeAspect="1"/>
-          </p:cNvSpPr>
-          <p:nvPr>
-            <p:ph type="sldImg"/>
-          </p:nvPr>
-        </p:nvSpPr>
-        <p:spPr/>
-      </p:sp>
-      <p:sp>
-        <p:nvSpPr>
-          <p:cNvPr id="3" name="Notes Placeholder 2"/>
-          <p:cNvSpPr>
-            <a:spLocks noGrp="1"/>
-          </p:cNvSpPr>
-          <p:nvPr>
-            <p:ph type="body" idx="1"/>
-          </p:nvPr>
-        </p:nvSpPr>
-        <p:spPr/>
-        <p:txBody>
-          <a:bodyPr/>
-          <a:lstStyle/>
-          <a:p>
-            <a:r>
-              <a:rPr lang="en-US" dirty="0" smtClean="0"/>
-              <a:t>LIU</a:t>
-            </a:r>
-            <a:endParaRPr lang="en-US" dirty="0"/>
-          </a:p>
-        </p:txBody>
-      </p:sp>
-      <p:sp>
-        <p:nvSpPr>
-          <p:cNvPr id="4" name="Slide Number Placeholder 3"/>
-          <p:cNvSpPr>
-            <a:spLocks noGrp="1"/>
-          </p:cNvSpPr>
-          <p:nvPr>
-            <p:ph type="sldNum" sz="quarter" idx="10"/>
-          </p:nvPr>
-        </p:nvSpPr>
-        <p:spPr/>
-        <p:txBody>
-          <a:bodyPr/>
-          <a:lstStyle/>
-          <a:p>
-            <a:fld id="{1ECD8851-0277-734A-B183-C70A1D731BF2}" type="slidenum">
-              <a:rPr lang="en-US" smtClean="0"/>
-              <a:t>10</a:t>
-            </a:fld>
-            <a:endParaRPr lang="en-US"/>
-          </a:p>
-        </p:txBody>
-      </p:sp>
-    </p:spTree>
-    <p:extLst>
-      <p:ext uri="{BB962C8B-B14F-4D97-AF65-F5344CB8AC3E}">
-        <p14:creationId xmlns:p14="http://schemas.microsoft.com/office/powerpoint/2010/main" val="911168791"/>
-      </p:ext>
-    </p:extLst>
-  </p:cSld>
-  <p:clrMapOvr>
-    <a:masterClrMapping/>
-  </p:clrMapOvr>
-</p:notes>
-</file>
-
-<file path=ppt/notesSlides/notesSlide8.xml><?xml version="1.0" encoding="utf-8"?>
-<p:notes xmlns:a="http://schemas.openxmlformats.org/drawingml/2006/main" xmlns:r="http://schemas.openxmlformats.org/officeDocument/2006/relationships" xmlns:p="http://schemas.openxmlformats.org/presentationml/2006/main">
-  <p:cSld>
-    <p:spTree>
-      <p:nvGrpSpPr>
-        <p:cNvPr id="1" name=""/>
-        <p:cNvGrpSpPr/>
-        <p:nvPr/>
-      </p:nvGrpSpPr>
-      <p:grpSpPr>
-        <a:xfrm>
-          <a:off x="0" y="0"/>
-          <a:ext cx="0" cy="0"/>
-          <a:chOff x="0" y="0"/>
-          <a:chExt cx="0" cy="0"/>
-        </a:xfrm>
-      </p:grpSpPr>
-      <p:sp>
-        <p:nvSpPr>
-          <p:cNvPr id="2" name="Slide Image Placeholder 1"/>
-          <p:cNvSpPr>
-            <a:spLocks noGrp="1" noRot="1" noChangeAspect="1"/>
-          </p:cNvSpPr>
-          <p:nvPr>
-            <p:ph type="sldImg"/>
-          </p:nvPr>
-        </p:nvSpPr>
-        <p:spPr/>
-      </p:sp>
-      <p:sp>
-        <p:nvSpPr>
-          <p:cNvPr id="3" name="Notes Placeholder 2"/>
-          <p:cNvSpPr>
-            <a:spLocks noGrp="1"/>
-          </p:cNvSpPr>
-          <p:nvPr>
-            <p:ph type="body" idx="1"/>
-          </p:nvPr>
-        </p:nvSpPr>
-        <p:spPr/>
-        <p:txBody>
-          <a:bodyPr/>
-          <a:lstStyle/>
-          <a:p>
-            <a:r>
-              <a:rPr lang="en-US" dirty="0" smtClean="0"/>
-              <a:t>LIU</a:t>
-            </a:r>
-            <a:endParaRPr lang="en-US" dirty="0"/>
-          </a:p>
-        </p:txBody>
-      </p:sp>
-      <p:sp>
-        <p:nvSpPr>
-          <p:cNvPr id="4" name="Slide Number Placeholder 3"/>
-          <p:cNvSpPr>
-            <a:spLocks noGrp="1"/>
-          </p:cNvSpPr>
-          <p:nvPr>
-            <p:ph type="sldNum" sz="quarter" idx="10"/>
-          </p:nvPr>
-        </p:nvSpPr>
-        <p:spPr/>
-        <p:txBody>
-          <a:bodyPr/>
-          <a:lstStyle/>
-          <a:p>
-            <a:fld id="{1ECD8851-0277-734A-B183-C70A1D731BF2}" type="slidenum">
-              <a:rPr lang="en-US" smtClean="0"/>
-              <a:t>11</a:t>
-            </a:fld>
-            <a:endParaRPr lang="en-US"/>
-          </a:p>
-        </p:txBody>
-      </p:sp>
-    </p:spTree>
-    <p:extLst>
-      <p:ext uri="{BB962C8B-B14F-4D97-AF65-F5344CB8AC3E}">
-        <p14:creationId xmlns:p14="http://schemas.microsoft.com/office/powerpoint/2010/main" val="1873748430"/>
-      </p:ext>
-    </p:extLst>
-  </p:cSld>
-  <p:clrMapOvr>
-    <a:masterClrMapping/>
-  </p:clrMapOvr>
-</p:notes>
-</file>
-
-<file path=ppt/notesSlides/notesSlide9.xml><?xml version="1.0" encoding="utf-8"?>
-<p:notes xmlns:a="http://schemas.openxmlformats.org/drawingml/2006/main" xmlns:r="http://schemas.openxmlformats.org/officeDocument/2006/relationships" xmlns:p="http://schemas.openxmlformats.org/presentationml/2006/main">
-  <p:cSld>
-    <p:spTree>
-      <p:nvGrpSpPr>
-        <p:cNvPr id="1" name=""/>
-        <p:cNvGrpSpPr/>
-        <p:nvPr/>
-      </p:nvGrpSpPr>
-      <p:grpSpPr>
-        <a:xfrm>
-          <a:off x="0" y="0"/>
-          <a:ext cx="0" cy="0"/>
-          <a:chOff x="0" y="0"/>
-          <a:chExt cx="0" cy="0"/>
-        </a:xfrm>
-      </p:grpSpPr>
-      <p:sp>
-        <p:nvSpPr>
-          <p:cNvPr id="2" name="Slide Image Placeholder 1"/>
-          <p:cNvSpPr>
-            <a:spLocks noGrp="1" noRot="1" noChangeAspect="1"/>
-          </p:cNvSpPr>
-          <p:nvPr>
-            <p:ph type="sldImg"/>
-          </p:nvPr>
-        </p:nvSpPr>
-        <p:spPr/>
-      </p:sp>
-      <p:sp>
-        <p:nvSpPr>
-          <p:cNvPr id="3" name="Notes Placeholder 2"/>
-          <p:cNvSpPr>
-            <a:spLocks noGrp="1"/>
-          </p:cNvSpPr>
-          <p:nvPr>
-            <p:ph type="body" idx="1"/>
-          </p:nvPr>
-        </p:nvSpPr>
-        <p:spPr/>
-        <p:txBody>
-          <a:bodyPr/>
-          <a:lstStyle/>
-          <a:p>
-            <a:r>
-              <a:rPr lang="en-US" dirty="0" smtClean="0"/>
-              <a:t>LIU</a:t>
-            </a:r>
-            <a:endParaRPr lang="en-US" dirty="0"/>
-          </a:p>
-        </p:txBody>
-      </p:sp>
-      <p:sp>
-        <p:nvSpPr>
-          <p:cNvPr id="4" name="Slide Number Placeholder 3"/>
-          <p:cNvSpPr>
-            <a:spLocks noGrp="1"/>
-          </p:cNvSpPr>
-          <p:nvPr>
-            <p:ph type="sldNum" sz="quarter" idx="10"/>
-          </p:nvPr>
-        </p:nvSpPr>
-        <p:spPr/>
-        <p:txBody>
-          <a:bodyPr/>
-          <a:lstStyle/>
-          <a:p>
-            <a:fld id="{1ECD8851-0277-734A-B183-C70A1D731BF2}" type="slidenum">
-              <a:rPr lang="en-US" smtClean="0"/>
-              <a:t>12</a:t>
-            </a:fld>
-            <a:endParaRPr lang="en-US"/>
-          </a:p>
-        </p:txBody>
-      </p:sp>
-    </p:spTree>
-    <p:extLst>
-      <p:ext uri="{BB962C8B-B14F-4D97-AF65-F5344CB8AC3E}">
-        <p14:creationId xmlns:p14="http://schemas.microsoft.com/office/powerpoint/2010/main" val="3142949496"/>
-      </p:ext>
-    </p:extLst>
-  </p:cSld>
-  <p:clrMapOvr>
-    <a:masterClrMapping/>
-  </p:clrMapOvr>
-</p:notes>
-</file>
-
 <file path=ppt/slideLayouts/slideLayout1.xml><?xml version="1.0" encoding="utf-8"?>
 <p:sldLayout xmlns:a="http://schemas.openxmlformats.org/drawingml/2006/main" xmlns:r="http://schemas.openxmlformats.org/officeDocument/2006/relationships" xmlns:p="http://schemas.openxmlformats.org/presentationml/2006/main" type="title" preserve="1">
   <p:cSld name="Title Slide">
@@ -2159,7 +307,7 @@
           <a:p>
             <a:fld id="{CC139C5B-16B4-EB40-AF61-676C485F9F96}" type="datetimeFigureOut">
               <a:rPr lang="en-US" smtClean="0"/>
-              <a:t>5/6/15</a:t>
+              <a:t>5/5/15</a:t>
             </a:fld>
             <a:endParaRPr lang="en-US"/>
           </a:p>
@@ -2329,7 +477,7 @@
           <a:p>
             <a:fld id="{CC139C5B-16B4-EB40-AF61-676C485F9F96}" type="datetimeFigureOut">
               <a:rPr lang="en-US" smtClean="0"/>
-              <a:t>5/6/15</a:t>
+              <a:t>5/5/15</a:t>
             </a:fld>
             <a:endParaRPr lang="en-US"/>
           </a:p>
@@ -2509,7 +657,7 @@
           <a:p>
             <a:fld id="{CC139C5B-16B4-EB40-AF61-676C485F9F96}" type="datetimeFigureOut">
               <a:rPr lang="en-US" smtClean="0"/>
-              <a:t>5/6/15</a:t>
+              <a:t>5/5/15</a:t>
             </a:fld>
             <a:endParaRPr lang="en-US"/>
           </a:p>
@@ -2679,7 +827,7 @@
           <a:p>
             <a:fld id="{CC139C5B-16B4-EB40-AF61-676C485F9F96}" type="datetimeFigureOut">
               <a:rPr lang="en-US" smtClean="0"/>
-              <a:t>5/6/15</a:t>
+              <a:t>5/5/15</a:t>
             </a:fld>
             <a:endParaRPr lang="en-US"/>
           </a:p>
@@ -2925,7 +1073,7 @@
           <a:p>
             <a:fld id="{CC139C5B-16B4-EB40-AF61-676C485F9F96}" type="datetimeFigureOut">
               <a:rPr lang="en-US" smtClean="0"/>
-              <a:t>5/6/15</a:t>
+              <a:t>5/5/15</a:t>
             </a:fld>
             <a:endParaRPr lang="en-US"/>
           </a:p>
@@ -3213,7 +1361,7 @@
           <a:p>
             <a:fld id="{CC139C5B-16B4-EB40-AF61-676C485F9F96}" type="datetimeFigureOut">
               <a:rPr lang="en-US" smtClean="0"/>
-              <a:t>5/6/15</a:t>
+              <a:t>5/5/15</a:t>
             </a:fld>
             <a:endParaRPr lang="en-US"/>
           </a:p>
@@ -3635,7 +1783,7 @@
           <a:p>
             <a:fld id="{CC139C5B-16B4-EB40-AF61-676C485F9F96}" type="datetimeFigureOut">
               <a:rPr lang="en-US" smtClean="0"/>
-              <a:t>5/6/15</a:t>
+              <a:t>5/5/15</a:t>
             </a:fld>
             <a:endParaRPr lang="en-US"/>
           </a:p>
@@ -3753,7 +1901,7 @@
           <a:p>
             <a:fld id="{CC139C5B-16B4-EB40-AF61-676C485F9F96}" type="datetimeFigureOut">
               <a:rPr lang="en-US" smtClean="0"/>
-              <a:t>5/6/15</a:t>
+              <a:t>5/5/15</a:t>
             </a:fld>
             <a:endParaRPr lang="en-US"/>
           </a:p>
@@ -3848,7 +1996,7 @@
           <a:p>
             <a:fld id="{CC139C5B-16B4-EB40-AF61-676C485F9F96}" type="datetimeFigureOut">
               <a:rPr lang="en-US" smtClean="0"/>
-              <a:t>5/6/15</a:t>
+              <a:t>5/5/15</a:t>
             </a:fld>
             <a:endParaRPr lang="en-US"/>
           </a:p>
@@ -4125,7 +2273,7 @@
           <a:p>
             <a:fld id="{CC139C5B-16B4-EB40-AF61-676C485F9F96}" type="datetimeFigureOut">
               <a:rPr lang="en-US" smtClean="0"/>
-              <a:t>5/6/15</a:t>
+              <a:t>5/5/15</a:t>
             </a:fld>
             <a:endParaRPr lang="en-US"/>
           </a:p>
@@ -4378,7 +2526,7 @@
           <a:p>
             <a:fld id="{CC139C5B-16B4-EB40-AF61-676C485F9F96}" type="datetimeFigureOut">
               <a:rPr lang="en-US" smtClean="0"/>
-              <a:t>5/6/15</a:t>
+              <a:t>5/5/15</a:t>
             </a:fld>
             <a:endParaRPr lang="en-US"/>
           </a:p>
@@ -4591,7 +2739,7 @@
           <a:p>
             <a:fld id="{CC139C5B-16B4-EB40-AF61-676C485F9F96}" type="datetimeFigureOut">
               <a:rPr lang="en-US" smtClean="0"/>
-              <a:t>5/6/15</a:t>
+              <a:t>5/5/15</a:t>
             </a:fld>
             <a:endParaRPr lang="en-US"/>
           </a:p>
@@ -5399,29 +3547,22 @@
       </p:grpSpPr>
       <p:sp>
         <p:nvSpPr>
-          <p:cNvPr id="4" name="TextBox 3"/>
-          <p:cNvSpPr txBox="1"/>
-          <p:nvPr/>
-        </p:nvSpPr>
-        <p:spPr>
-          <a:xfrm>
-            <a:off x="185195" y="1018695"/>
-            <a:ext cx="1078240" cy="369332"/>
-          </a:xfrm>
-          <a:prstGeom prst="rect">
-            <a:avLst/>
-          </a:prstGeom>
-          <a:noFill/>
-        </p:spPr>
-        <p:txBody>
-          <a:bodyPr wrap="none" rtlCol="0">
-            <a:spAutoFit/>
-          </a:bodyPr>
-          <a:lstStyle/>
-          <a:p>
-            <a:r>
-              <a:rPr lang="en-US" dirty="0" smtClean="0"/>
-              <a:t>Raw Data</a:t>
+          <p:cNvPr id="2" name="Title 1"/>
+          <p:cNvSpPr>
+            <a:spLocks noGrp="1"/>
+          </p:cNvSpPr>
+          <p:nvPr>
+            <p:ph type="title"/>
+          </p:nvPr>
+        </p:nvSpPr>
+        <p:spPr/>
+        <p:txBody>
+          <a:bodyPr/>
+          <a:lstStyle/>
+          <a:p>
+            <a:r>
+              <a:rPr lang="en-US" dirty="0" err="1" smtClean="0"/>
+              <a:t>Heatmaps</a:t>
             </a:r>
             <a:endParaRPr lang="en-US" dirty="0"/>
           </a:p>
@@ -5429,750 +3570,27 @@
       </p:sp>
       <p:sp>
         <p:nvSpPr>
-          <p:cNvPr id="5" name="TextBox 4"/>
-          <p:cNvSpPr txBox="1"/>
-          <p:nvPr/>
-        </p:nvSpPr>
-        <p:spPr>
-          <a:xfrm>
-            <a:off x="185195" y="2441157"/>
-            <a:ext cx="989536" cy="369332"/>
-          </a:xfrm>
-          <a:prstGeom prst="rect">
-            <a:avLst/>
-          </a:prstGeom>
-          <a:noFill/>
-        </p:spPr>
-        <p:txBody>
-          <a:bodyPr wrap="none" rtlCol="0">
-            <a:spAutoFit/>
-          </a:bodyPr>
-          <a:lstStyle/>
-          <a:p>
-            <a:r>
-              <a:rPr lang="en-US" dirty="0" err="1" smtClean="0"/>
-              <a:t>Quantile</a:t>
-            </a:r>
-            <a:endParaRPr lang="en-US" dirty="0"/>
-          </a:p>
-        </p:txBody>
-      </p:sp>
-      <p:sp>
-        <p:nvSpPr>
-          <p:cNvPr id="6" name="TextBox 5"/>
-          <p:cNvSpPr txBox="1"/>
-          <p:nvPr/>
-        </p:nvSpPr>
-        <p:spPr>
-          <a:xfrm>
-            <a:off x="185195" y="4207593"/>
-            <a:ext cx="1404990" cy="369332"/>
-          </a:xfrm>
-          <a:prstGeom prst="rect">
-            <a:avLst/>
-          </a:prstGeom>
-          <a:noFill/>
-        </p:spPr>
-        <p:txBody>
-          <a:bodyPr wrap="none" rtlCol="0">
-            <a:spAutoFit/>
-          </a:bodyPr>
-          <a:lstStyle/>
-          <a:p>
-            <a:r>
-              <a:rPr lang="en-US" dirty="0" smtClean="0"/>
-              <a:t>Pair </a:t>
-            </a:r>
-            <a:r>
-              <a:rPr lang="en-US" dirty="0" err="1" smtClean="0"/>
-              <a:t>Quantile</a:t>
-            </a:r>
-            <a:endParaRPr lang="en-US" dirty="0"/>
-          </a:p>
-        </p:txBody>
-      </p:sp>
-      <p:sp>
-        <p:nvSpPr>
-          <p:cNvPr id="7" name="TextBox 6"/>
-          <p:cNvSpPr txBox="1"/>
-          <p:nvPr/>
-        </p:nvSpPr>
-        <p:spPr>
-          <a:xfrm>
-            <a:off x="185195" y="5868190"/>
-            <a:ext cx="884151" cy="369332"/>
-          </a:xfrm>
-          <a:prstGeom prst="rect">
-            <a:avLst/>
-          </a:prstGeom>
-          <a:noFill/>
-        </p:spPr>
-        <p:txBody>
-          <a:bodyPr wrap="none" rtlCol="0">
-            <a:spAutoFit/>
-          </a:bodyPr>
-          <a:lstStyle/>
-          <a:p>
-            <a:r>
-              <a:rPr lang="en-US" dirty="0" smtClean="0"/>
-              <a:t>Z-Score</a:t>
-            </a:r>
-            <a:endParaRPr lang="en-US" dirty="0"/>
-          </a:p>
-        </p:txBody>
-      </p:sp>
-      <p:sp>
-        <p:nvSpPr>
-          <p:cNvPr id="8" name="TextBox 7"/>
-          <p:cNvSpPr txBox="1"/>
-          <p:nvPr/>
-        </p:nvSpPr>
-        <p:spPr>
-          <a:xfrm>
-            <a:off x="2725011" y="18806"/>
-            <a:ext cx="883475" cy="646331"/>
-          </a:xfrm>
-          <a:prstGeom prst="rect">
-            <a:avLst/>
-          </a:prstGeom>
-          <a:noFill/>
-        </p:spPr>
-        <p:txBody>
-          <a:bodyPr wrap="none" rtlCol="0">
-            <a:spAutoFit/>
-          </a:bodyPr>
-          <a:lstStyle/>
-          <a:p>
-            <a:r>
-              <a:rPr lang="en-US" dirty="0" smtClean="0"/>
-              <a:t>No PCA</a:t>
-            </a:r>
-          </a:p>
-          <a:p>
-            <a:endParaRPr lang="en-US" dirty="0"/>
-          </a:p>
-        </p:txBody>
-      </p:sp>
-      <p:sp>
-        <p:nvSpPr>
-          <p:cNvPr id="9" name="TextBox 8"/>
-          <p:cNvSpPr txBox="1"/>
-          <p:nvPr/>
-        </p:nvSpPr>
-        <p:spPr>
-          <a:xfrm>
-            <a:off x="6806189" y="-8504"/>
-            <a:ext cx="560558" cy="646331"/>
-          </a:xfrm>
-          <a:prstGeom prst="rect">
-            <a:avLst/>
-          </a:prstGeom>
-          <a:noFill/>
-        </p:spPr>
-        <p:txBody>
-          <a:bodyPr wrap="none" rtlCol="0">
-            <a:spAutoFit/>
-          </a:bodyPr>
-          <a:lstStyle/>
-          <a:p>
-            <a:r>
-              <a:rPr lang="en-US" dirty="0" smtClean="0"/>
-              <a:t>PCA</a:t>
-            </a:r>
-          </a:p>
-          <a:p>
-            <a:endParaRPr lang="en-US" dirty="0"/>
-          </a:p>
-        </p:txBody>
-      </p:sp>
-      <p:grpSp>
-        <p:nvGrpSpPr>
-          <p:cNvPr id="15" name="Group 14"/>
-          <p:cNvGrpSpPr/>
-          <p:nvPr/>
-        </p:nvGrpSpPr>
-        <p:grpSpPr>
-          <a:xfrm>
-            <a:off x="1801979" y="2163439"/>
-            <a:ext cx="3008997" cy="1412751"/>
-            <a:chOff x="1069346" y="2225952"/>
-            <a:chExt cx="3556685" cy="1669895"/>
-          </a:xfrm>
-        </p:grpSpPr>
-        <p:pic>
-          <p:nvPicPr>
-            <p:cNvPr id="10" name="Picture 9" descr="Quantile_Color.jpg"/>
-            <p:cNvPicPr>
-              <a:picLocks noChangeAspect="1"/>
-            </p:cNvPicPr>
-            <p:nvPr/>
-          </p:nvPicPr>
-          <p:blipFill rotWithShape="1">
-            <a:blip r:embed="rId3">
-              <a:extLst>
-                <a:ext uri="{28A0092B-C50C-407E-A947-70E740481C1C}">
-                  <a14:useLocalDpi xmlns:a14="http://schemas.microsoft.com/office/drawing/2010/main" val="0"/>
-                </a:ext>
-              </a:extLst>
-            </a:blip>
-            <a:srcRect l="7722" t="27007" r="77553" b="9047"/>
-            <a:stretch/>
-          </p:blipFill>
-          <p:spPr>
-            <a:xfrm>
-              <a:off x="1069346" y="2225952"/>
-              <a:ext cx="2330303" cy="1669895"/>
-            </a:xfrm>
-            <a:prstGeom prst="rect">
-              <a:avLst/>
-            </a:prstGeom>
-          </p:spPr>
-        </p:pic>
-        <p:pic>
-          <p:nvPicPr>
-            <p:cNvPr id="12" name="Picture 11" descr="Quantile_Color.jpg"/>
-            <p:cNvPicPr>
-              <a:picLocks noChangeAspect="1"/>
-            </p:cNvPicPr>
-            <p:nvPr/>
-          </p:nvPicPr>
-          <p:blipFill rotWithShape="1">
-            <a:blip r:embed="rId3">
-              <a:extLst>
-                <a:ext uri="{28A0092B-C50C-407E-A947-70E740481C1C}">
-                  <a14:useLocalDpi xmlns:a14="http://schemas.microsoft.com/office/drawing/2010/main" val="0"/>
-                </a:ext>
-              </a:extLst>
-            </a:blip>
-            <a:srcRect l="22448" t="27007" r="31693" b="9047"/>
-            <a:stretch/>
-          </p:blipFill>
-          <p:spPr>
-            <a:xfrm>
-              <a:off x="3184156" y="2225952"/>
-              <a:ext cx="1441875" cy="1669895"/>
-            </a:xfrm>
-            <a:prstGeom prst="rect">
-              <a:avLst/>
-            </a:prstGeom>
-          </p:spPr>
-        </p:pic>
-      </p:grpSp>
-      <p:grpSp>
-        <p:nvGrpSpPr>
-          <p:cNvPr id="27" name="Group 26"/>
-          <p:cNvGrpSpPr/>
-          <p:nvPr/>
-        </p:nvGrpSpPr>
-        <p:grpSpPr>
-          <a:xfrm>
-            <a:off x="5552984" y="2163439"/>
-            <a:ext cx="2890382" cy="1427297"/>
-            <a:chOff x="5552985" y="2249987"/>
-            <a:chExt cx="2890382" cy="1427297"/>
-          </a:xfrm>
-        </p:grpSpPr>
-        <p:pic>
-          <p:nvPicPr>
-            <p:cNvPr id="11" name="Picture 10" descr="Quantiled_PCA_Color.jpg"/>
-            <p:cNvPicPr>
-              <a:picLocks noChangeAspect="1"/>
-            </p:cNvPicPr>
-            <p:nvPr/>
-          </p:nvPicPr>
-          <p:blipFill rotWithShape="1">
-            <a:blip r:embed="rId4">
-              <a:extLst>
-                <a:ext uri="{28A0092B-C50C-407E-A947-70E740481C1C}">
-                  <a14:useLocalDpi xmlns:a14="http://schemas.microsoft.com/office/drawing/2010/main" val="0"/>
-                </a:ext>
-              </a:extLst>
-            </a:blip>
-            <a:srcRect l="8640" t="27511" r="81105" b="9154"/>
-            <a:stretch/>
-          </p:blipFill>
-          <p:spPr>
-            <a:xfrm>
-              <a:off x="5552985" y="2249987"/>
-              <a:ext cx="1794816" cy="1427297"/>
-            </a:xfrm>
-            <a:prstGeom prst="rect">
-              <a:avLst/>
-            </a:prstGeom>
-          </p:spPr>
-        </p:pic>
-        <p:pic>
-          <p:nvPicPr>
-            <p:cNvPr id="13" name="Picture 12" descr="Quantiled_PCA_Color.jpg"/>
-            <p:cNvPicPr>
-              <a:picLocks noChangeAspect="1"/>
-            </p:cNvPicPr>
-            <p:nvPr/>
-          </p:nvPicPr>
-          <p:blipFill rotWithShape="1">
-            <a:blip r:embed="rId4">
-              <a:extLst>
-                <a:ext uri="{28A0092B-C50C-407E-A947-70E740481C1C}">
-                  <a14:useLocalDpi xmlns:a14="http://schemas.microsoft.com/office/drawing/2010/main" val="0"/>
-                </a:ext>
-              </a:extLst>
-            </a:blip>
-            <a:srcRect l="18896" t="27511" r="43048" b="9154"/>
-            <a:stretch/>
-          </p:blipFill>
-          <p:spPr>
-            <a:xfrm>
-              <a:off x="7297148" y="2249987"/>
-              <a:ext cx="1146219" cy="1427297"/>
-            </a:xfrm>
-            <a:prstGeom prst="rect">
-              <a:avLst/>
-            </a:prstGeom>
-          </p:spPr>
-        </p:pic>
-      </p:grpSp>
-      <p:grpSp>
-        <p:nvGrpSpPr>
-          <p:cNvPr id="22" name="Group 21"/>
-          <p:cNvGrpSpPr/>
-          <p:nvPr/>
-        </p:nvGrpSpPr>
-        <p:grpSpPr>
-          <a:xfrm>
-            <a:off x="1972823" y="637827"/>
-            <a:ext cx="2810843" cy="1437272"/>
-            <a:chOff x="1365540" y="710552"/>
-            <a:chExt cx="3454581" cy="1766435"/>
-          </a:xfrm>
-        </p:grpSpPr>
-        <p:pic>
-          <p:nvPicPr>
-            <p:cNvPr id="20" name="Picture 19" descr="Raw_color.jpg"/>
-            <p:cNvPicPr>
-              <a:picLocks noChangeAspect="1"/>
-            </p:cNvPicPr>
-            <p:nvPr/>
-          </p:nvPicPr>
-          <p:blipFill rotWithShape="1">
-            <a:blip r:embed="rId5">
-              <a:extLst>
-                <a:ext uri="{28A0092B-C50C-407E-A947-70E740481C1C}">
-                  <a14:useLocalDpi xmlns:a14="http://schemas.microsoft.com/office/drawing/2010/main" val="0"/>
-                </a:ext>
-              </a:extLst>
-            </a:blip>
-            <a:srcRect l="8314" t="26661" r="81339" b="11611"/>
-            <a:stretch/>
-          </p:blipFill>
-          <p:spPr>
-            <a:xfrm>
-              <a:off x="1365540" y="710552"/>
-              <a:ext cx="2012705" cy="1730606"/>
-            </a:xfrm>
-            <a:prstGeom prst="rect">
-              <a:avLst/>
-            </a:prstGeom>
-          </p:spPr>
-        </p:pic>
-        <p:pic>
-          <p:nvPicPr>
-            <p:cNvPr id="21" name="Picture 20" descr="Raw_color.jpg"/>
-            <p:cNvPicPr>
-              <a:picLocks noChangeAspect="1"/>
-            </p:cNvPicPr>
-            <p:nvPr/>
-          </p:nvPicPr>
-          <p:blipFill rotWithShape="1">
-            <a:blip r:embed="rId5">
-              <a:extLst>
-                <a:ext uri="{28A0092B-C50C-407E-A947-70E740481C1C}">
-                  <a14:useLocalDpi xmlns:a14="http://schemas.microsoft.com/office/drawing/2010/main" val="0"/>
-                </a:ext>
-              </a:extLst>
-            </a:blip>
-            <a:srcRect l="18661" t="26661" r="42860" b="11611"/>
-            <a:stretch/>
-          </p:blipFill>
-          <p:spPr>
-            <a:xfrm>
-              <a:off x="3378245" y="746381"/>
-              <a:ext cx="1441876" cy="1730606"/>
-            </a:xfrm>
-            <a:prstGeom prst="rect">
-              <a:avLst/>
-            </a:prstGeom>
-          </p:spPr>
-        </p:pic>
-      </p:grpSp>
-      <p:grpSp>
-        <p:nvGrpSpPr>
-          <p:cNvPr id="26" name="Group 25"/>
-          <p:cNvGrpSpPr/>
-          <p:nvPr/>
-        </p:nvGrpSpPr>
-        <p:grpSpPr>
-          <a:xfrm>
-            <a:off x="5448505" y="596524"/>
-            <a:ext cx="2994861" cy="1478575"/>
-            <a:chOff x="5448505" y="725314"/>
-            <a:chExt cx="2994861" cy="1478575"/>
-          </a:xfrm>
-        </p:grpSpPr>
-        <p:pic>
-          <p:nvPicPr>
-            <p:cNvPr id="23" name="Picture 22" descr="Raw_PCA_Color.jpg"/>
-            <p:cNvPicPr>
-              <a:picLocks noChangeAspect="1"/>
-            </p:cNvPicPr>
-            <p:nvPr/>
-          </p:nvPicPr>
-          <p:blipFill rotWithShape="1">
-            <a:blip r:embed="rId6">
-              <a:extLst>
-                <a:ext uri="{28A0092B-C50C-407E-A947-70E740481C1C}">
-                  <a14:useLocalDpi xmlns:a14="http://schemas.microsoft.com/office/drawing/2010/main" val="0"/>
-                </a:ext>
-              </a:extLst>
-            </a:blip>
-            <a:srcRect l="8073" t="27511" r="81123" b="8600"/>
-            <a:stretch/>
-          </p:blipFill>
-          <p:spPr>
-            <a:xfrm>
-              <a:off x="5448505" y="725314"/>
-              <a:ext cx="1905259" cy="1478575"/>
-            </a:xfrm>
-            <a:prstGeom prst="rect">
-              <a:avLst/>
-            </a:prstGeom>
-          </p:spPr>
-        </p:pic>
-        <p:pic>
-          <p:nvPicPr>
-            <p:cNvPr id="24" name="Picture 23" descr="Raw_PCA_Color.jpg"/>
-            <p:cNvPicPr>
-              <a:picLocks noChangeAspect="1"/>
-            </p:cNvPicPr>
-            <p:nvPr/>
-          </p:nvPicPr>
-          <p:blipFill rotWithShape="1">
-            <a:blip r:embed="rId6">
-              <a:extLst>
-                <a:ext uri="{28A0092B-C50C-407E-A947-70E740481C1C}">
-                  <a14:useLocalDpi xmlns:a14="http://schemas.microsoft.com/office/drawing/2010/main" val="0"/>
-                </a:ext>
-              </a:extLst>
-            </a:blip>
-            <a:srcRect l="19114" t="27511" r="44013" b="8600"/>
-            <a:stretch/>
-          </p:blipFill>
-          <p:spPr>
-            <a:xfrm>
-              <a:off x="7326356" y="748530"/>
-              <a:ext cx="1117010" cy="1448113"/>
-            </a:xfrm>
-            <a:prstGeom prst="rect">
-              <a:avLst/>
-            </a:prstGeom>
-          </p:spPr>
-        </p:pic>
-      </p:grpSp>
-      <p:grpSp>
-        <p:nvGrpSpPr>
-          <p:cNvPr id="32" name="Group 31"/>
-          <p:cNvGrpSpPr/>
-          <p:nvPr/>
-        </p:nvGrpSpPr>
-        <p:grpSpPr>
-          <a:xfrm>
-            <a:off x="5735267" y="3684528"/>
-            <a:ext cx="2708099" cy="1440341"/>
-            <a:chOff x="5735267" y="3684528"/>
-            <a:chExt cx="2708099" cy="1440341"/>
-          </a:xfrm>
-        </p:grpSpPr>
-        <p:pic>
-          <p:nvPicPr>
-            <p:cNvPr id="30" name="Picture 29" descr="Quantiled_pair_PCA_Color.jpg"/>
-            <p:cNvPicPr>
-              <a:picLocks noChangeAspect="1"/>
-            </p:cNvPicPr>
-            <p:nvPr/>
-          </p:nvPicPr>
-          <p:blipFill rotWithShape="1">
-            <a:blip r:embed="rId7">
-              <a:extLst>
-                <a:ext uri="{28A0092B-C50C-407E-A947-70E740481C1C}">
-                  <a14:useLocalDpi xmlns:a14="http://schemas.microsoft.com/office/drawing/2010/main" val="0"/>
-                </a:ext>
-              </a:extLst>
-            </a:blip>
-            <a:srcRect l="8969" t="28276" r="80845" b="8599"/>
-            <a:stretch/>
-          </p:blipFill>
-          <p:spPr>
-            <a:xfrm>
-              <a:off x="5735267" y="3684528"/>
-              <a:ext cx="1641734" cy="1440340"/>
-            </a:xfrm>
-            <a:prstGeom prst="rect">
-              <a:avLst/>
-            </a:prstGeom>
-          </p:spPr>
-        </p:pic>
-        <p:pic>
-          <p:nvPicPr>
-            <p:cNvPr id="31" name="Picture 30" descr="Quantiled_pair_PCA_Color.jpg"/>
-            <p:cNvPicPr>
-              <a:picLocks noChangeAspect="1"/>
-            </p:cNvPicPr>
-            <p:nvPr/>
-          </p:nvPicPr>
-          <p:blipFill rotWithShape="1">
-            <a:blip r:embed="rId7">
-              <a:extLst>
-                <a:ext uri="{28A0092B-C50C-407E-A947-70E740481C1C}">
-                  <a14:useLocalDpi xmlns:a14="http://schemas.microsoft.com/office/drawing/2010/main" val="0"/>
-                </a:ext>
-              </a:extLst>
-            </a:blip>
-            <a:srcRect l="19077" t="28276" r="43244" b="8599"/>
-            <a:stretch/>
-          </p:blipFill>
-          <p:spPr>
-            <a:xfrm>
-              <a:off x="7294326" y="3684529"/>
-              <a:ext cx="1149040" cy="1440340"/>
-            </a:xfrm>
-            <a:prstGeom prst="rect">
-              <a:avLst/>
-            </a:prstGeom>
-          </p:spPr>
-        </p:pic>
-      </p:grpSp>
-      <p:grpSp>
-        <p:nvGrpSpPr>
-          <p:cNvPr id="41" name="Group 40"/>
-          <p:cNvGrpSpPr/>
-          <p:nvPr/>
-        </p:nvGrpSpPr>
-        <p:grpSpPr>
-          <a:xfrm>
-            <a:off x="1972823" y="3590737"/>
-            <a:ext cx="2838152" cy="1434140"/>
-            <a:chOff x="1972823" y="3590737"/>
-            <a:chExt cx="2838152" cy="1434140"/>
-          </a:xfrm>
-        </p:grpSpPr>
-        <p:pic>
-          <p:nvPicPr>
-            <p:cNvPr id="33" name="Picture 32" descr="Quantiled_pair_Color.jpg"/>
-            <p:cNvPicPr>
-              <a:picLocks noChangeAspect="1"/>
-            </p:cNvPicPr>
-            <p:nvPr/>
-          </p:nvPicPr>
-          <p:blipFill rotWithShape="1">
-            <a:blip r:embed="rId8">
-              <a:extLst>
-                <a:ext uri="{28A0092B-C50C-407E-A947-70E740481C1C}">
-                  <a14:useLocalDpi xmlns:a14="http://schemas.microsoft.com/office/drawing/2010/main" val="0"/>
-                </a:ext>
-              </a:extLst>
-            </a:blip>
-            <a:srcRect l="9016" t="27662" r="80896" b="11915"/>
-            <a:stretch/>
-          </p:blipFill>
-          <p:spPr>
-            <a:xfrm>
-              <a:off x="1972823" y="3590737"/>
-              <a:ext cx="1692271" cy="1434140"/>
-            </a:xfrm>
-            <a:prstGeom prst="rect">
-              <a:avLst/>
-            </a:prstGeom>
-          </p:spPr>
-        </p:pic>
-        <p:pic>
-          <p:nvPicPr>
-            <p:cNvPr id="34" name="Picture 33" descr="Quantiled_pair_Color.jpg"/>
-            <p:cNvPicPr>
-              <a:picLocks noChangeAspect="1"/>
-            </p:cNvPicPr>
-            <p:nvPr/>
-          </p:nvPicPr>
-          <p:blipFill rotWithShape="1">
-            <a:blip r:embed="rId8">
-              <a:extLst>
-                <a:ext uri="{28A0092B-C50C-407E-A947-70E740481C1C}">
-                  <a14:useLocalDpi xmlns:a14="http://schemas.microsoft.com/office/drawing/2010/main" val="0"/>
-                </a:ext>
-              </a:extLst>
-            </a:blip>
-            <a:srcRect l="18494" t="27662" r="43052" b="11915"/>
-            <a:stretch/>
-          </p:blipFill>
-          <p:spPr>
-            <a:xfrm>
-              <a:off x="3591132" y="3590737"/>
-              <a:ext cx="1219843" cy="1434140"/>
-            </a:xfrm>
-            <a:prstGeom prst="rect">
-              <a:avLst/>
-            </a:prstGeom>
-          </p:spPr>
-        </p:pic>
-      </p:grpSp>
-      <p:grpSp>
-        <p:nvGrpSpPr>
-          <p:cNvPr id="40" name="Group 39"/>
-          <p:cNvGrpSpPr/>
-          <p:nvPr/>
-        </p:nvGrpSpPr>
-        <p:grpSpPr>
-          <a:xfrm>
-            <a:off x="5544090" y="5124868"/>
-            <a:ext cx="2875348" cy="1418084"/>
-            <a:chOff x="5544090" y="5124868"/>
-            <a:chExt cx="2875348" cy="1418084"/>
-          </a:xfrm>
-        </p:grpSpPr>
-        <p:pic>
-          <p:nvPicPr>
-            <p:cNvPr id="35" name="Picture 34" descr="Z_score_PCA_color.jpg"/>
-            <p:cNvPicPr>
-              <a:picLocks noChangeAspect="1"/>
-            </p:cNvPicPr>
-            <p:nvPr/>
-          </p:nvPicPr>
-          <p:blipFill rotWithShape="1">
-            <a:blip r:embed="rId9">
-              <a:extLst>
-                <a:ext uri="{28A0092B-C50C-407E-A947-70E740481C1C}">
-                  <a14:useLocalDpi xmlns:a14="http://schemas.microsoft.com/office/drawing/2010/main" val="0"/>
-                </a:ext>
-              </a:extLst>
-            </a:blip>
-            <a:srcRect l="7026" t="27605" r="80626" b="9252"/>
-            <a:stretch/>
-          </p:blipFill>
-          <p:spPr>
-            <a:xfrm>
-              <a:off x="5544090" y="5124869"/>
-              <a:ext cx="1877851" cy="1418083"/>
-            </a:xfrm>
-            <a:prstGeom prst="rect">
-              <a:avLst/>
-            </a:prstGeom>
-          </p:spPr>
-        </p:pic>
-        <p:pic>
-          <p:nvPicPr>
-            <p:cNvPr id="36" name="Picture 35" descr="Z_score_PCA_color.jpg"/>
-            <p:cNvPicPr>
-              <a:picLocks noChangeAspect="1"/>
-            </p:cNvPicPr>
-            <p:nvPr/>
-          </p:nvPicPr>
-          <p:blipFill rotWithShape="1">
-            <a:blip r:embed="rId9">
-              <a:extLst>
-                <a:ext uri="{28A0092B-C50C-407E-A947-70E740481C1C}">
-                  <a14:useLocalDpi xmlns:a14="http://schemas.microsoft.com/office/drawing/2010/main" val="0"/>
-                </a:ext>
-              </a:extLst>
-            </a:blip>
-            <a:srcRect l="19975" t="27605" r="43413" b="9252"/>
-            <a:stretch/>
-          </p:blipFill>
-          <p:spPr>
-            <a:xfrm>
-              <a:off x="7320490" y="5124868"/>
-              <a:ext cx="1098948" cy="1418083"/>
-            </a:xfrm>
-            <a:prstGeom prst="rect">
-              <a:avLst/>
-            </a:prstGeom>
-          </p:spPr>
-        </p:pic>
-      </p:grpSp>
-      <p:grpSp>
-        <p:nvGrpSpPr>
-          <p:cNvPr id="39" name="Group 38"/>
-          <p:cNvGrpSpPr/>
-          <p:nvPr/>
-        </p:nvGrpSpPr>
-        <p:grpSpPr>
-          <a:xfrm>
-            <a:off x="1986478" y="5147772"/>
-            <a:ext cx="2824497" cy="1446112"/>
-            <a:chOff x="1986478" y="5147772"/>
-            <a:chExt cx="2824497" cy="1446112"/>
-          </a:xfrm>
-        </p:grpSpPr>
-        <p:pic>
-          <p:nvPicPr>
-            <p:cNvPr id="37" name="Picture 36" descr="Z_score_color.jpg"/>
-            <p:cNvPicPr>
-              <a:picLocks noChangeAspect="1"/>
-            </p:cNvPicPr>
-            <p:nvPr/>
-          </p:nvPicPr>
-          <p:blipFill rotWithShape="1">
-            <a:blip r:embed="rId10">
-              <a:extLst>
-                <a:ext uri="{28A0092B-C50C-407E-A947-70E740481C1C}">
-                  <a14:useLocalDpi xmlns:a14="http://schemas.microsoft.com/office/drawing/2010/main" val="0"/>
-                </a:ext>
-              </a:extLst>
-            </a:blip>
-            <a:srcRect l="8820" t="27491" r="81539" b="11191"/>
-            <a:stretch/>
-          </p:blipFill>
-          <p:spPr>
-            <a:xfrm>
-              <a:off x="1986478" y="5147772"/>
-              <a:ext cx="1635663" cy="1446112"/>
-            </a:xfrm>
-            <a:prstGeom prst="rect">
-              <a:avLst/>
-            </a:prstGeom>
-          </p:spPr>
-        </p:pic>
-        <p:pic>
-          <p:nvPicPr>
-            <p:cNvPr id="38" name="Picture 37" descr="Z_score_color.jpg"/>
-            <p:cNvPicPr>
-              <a:picLocks noChangeAspect="1"/>
-            </p:cNvPicPr>
-            <p:nvPr/>
-          </p:nvPicPr>
-          <p:blipFill rotWithShape="1">
-            <a:blip r:embed="rId10">
-              <a:extLst>
-                <a:ext uri="{28A0092B-C50C-407E-A947-70E740481C1C}">
-                  <a14:useLocalDpi xmlns:a14="http://schemas.microsoft.com/office/drawing/2010/main" val="0"/>
-                </a:ext>
-              </a:extLst>
-            </a:blip>
-            <a:srcRect l="20256" t="27491" r="43390" b="11191"/>
-            <a:stretch/>
-          </p:blipFill>
-          <p:spPr>
-            <a:xfrm>
-              <a:off x="3624129" y="5147772"/>
-              <a:ext cx="1186846" cy="1446112"/>
-            </a:xfrm>
-            <a:prstGeom prst="rect">
-              <a:avLst/>
-            </a:prstGeom>
-          </p:spPr>
-        </p:pic>
-      </p:grpSp>
+          <p:cNvPr id="3" name="Content Placeholder 2"/>
+          <p:cNvSpPr>
+            <a:spLocks noGrp="1"/>
+          </p:cNvSpPr>
+          <p:nvPr>
+            <p:ph idx="1"/>
+          </p:nvPr>
+        </p:nvSpPr>
+        <p:spPr/>
+        <p:txBody>
+          <a:bodyPr/>
+          <a:lstStyle/>
+          <a:p>
+            <a:endParaRPr lang="en-US"/>
+          </a:p>
+        </p:txBody>
+      </p:sp>
     </p:spTree>
     <p:extLst>
       <p:ext uri="{BB962C8B-B14F-4D97-AF65-F5344CB8AC3E}">
-        <p14:creationId xmlns:p14="http://schemas.microsoft.com/office/powerpoint/2010/main" val="2802221260"/>
+        <p14:creationId xmlns:p14="http://schemas.microsoft.com/office/powerpoint/2010/main" val="3994164514"/>
       </p:ext>
     </p:extLst>
   </p:cSld>
@@ -6216,7 +3634,7 @@
           <a:p>
             <a:r>
               <a:rPr lang="en-US" dirty="0" smtClean="0"/>
-              <a:t>PCA Scatters</a:t>
+              <a:t>PCA</a:t>
             </a:r>
             <a:endParaRPr lang="en-US" dirty="0"/>
           </a:p>
@@ -6288,7 +3706,7 @@
           <a:p>
             <a:r>
               <a:rPr lang="en-US" dirty="0" smtClean="0"/>
-              <a:t>Confusion Matrix</a:t>
+              <a:t>Summary of Findings</a:t>
             </a:r>
             <a:endParaRPr lang="en-US" dirty="0"/>
           </a:p>
@@ -6306,17 +3724,46 @@
         </p:nvSpPr>
         <p:spPr/>
         <p:txBody>
-          <a:bodyPr/>
-          <a:lstStyle/>
-          <a:p>
-            <a:endParaRPr lang="en-US"/>
+          <a:bodyPr>
+            <a:normAutofit fontScale="70000" lnSpcReduction="20000"/>
+          </a:bodyPr>
+          <a:lstStyle/>
+          <a:p>
+            <a:endParaRPr lang="en-US" dirty="0" smtClean="0"/>
+          </a:p>
+          <a:p>
+            <a:endParaRPr lang="en-US" dirty="0"/>
+          </a:p>
+          <a:p>
+            <a:endParaRPr lang="en-US" dirty="0" smtClean="0"/>
+          </a:p>
+          <a:p>
+            <a:r>
+              <a:rPr lang="en-US" dirty="0" err="1" smtClean="0"/>
+              <a:t>Gitter</a:t>
+            </a:r>
+            <a:r>
+              <a:rPr lang="en-US" dirty="0" smtClean="0"/>
+              <a:t> Note:</a:t>
+            </a:r>
+            <a:endParaRPr lang="en-US" dirty="0"/>
+          </a:p>
+          <a:p>
+            <a:r>
+              <a:rPr lang="en-US" dirty="0" smtClean="0"/>
+              <a:t>Finally</a:t>
+            </a:r>
+            <a:r>
+              <a:rPr lang="en-US" dirty="0"/>
+              <a:t>, as you note in your report, as major challenge will be performing a summarizing meta-analysis to interpret the many clustering results. It will be difficult to interpret your results if they are presented as a series of clustering outputs without any further summarization. Try to arrive at a concise conclusion based on your data - i.e. these cell lines are good models of these tumor samples or cell line/tumor similarity is determined by step X in the pipeline as opposed to an inherent biological feature - and present the results in a way that builds toward that conclusion.</a:t>
+            </a:r>
           </a:p>
         </p:txBody>
       </p:sp>
     </p:spTree>
     <p:extLst>
       <p:ext uri="{BB962C8B-B14F-4D97-AF65-F5344CB8AC3E}">
-        <p14:creationId xmlns:p14="http://schemas.microsoft.com/office/powerpoint/2010/main" val="3685175460"/>
+        <p14:creationId xmlns:p14="http://schemas.microsoft.com/office/powerpoint/2010/main" val="97556309"/>
       </p:ext>
     </p:extLst>
   </p:cSld>
@@ -6360,7 +3807,7 @@
           <a:p>
             <a:r>
               <a:rPr lang="en-US" dirty="0" smtClean="0"/>
-              <a:t>Summary of Findings</a:t>
+              <a:t>Discussion</a:t>
             </a:r>
             <a:endParaRPr lang="en-US" dirty="0"/>
           </a:p>
@@ -6368,56 +3815,27 @@
       </p:sp>
       <p:sp>
         <p:nvSpPr>
-          <p:cNvPr id="3" name="Content Placeholder 2"/>
-          <p:cNvSpPr>
-            <a:spLocks noGrp="1"/>
-          </p:cNvSpPr>
-          <p:nvPr>
-            <p:ph idx="1"/>
-          </p:nvPr>
-        </p:nvSpPr>
-        <p:spPr/>
-        <p:txBody>
-          <a:bodyPr>
-            <a:normAutofit fontScale="70000" lnSpcReduction="20000"/>
-          </a:bodyPr>
-          <a:lstStyle/>
-          <a:p>
-            <a:endParaRPr lang="en-US" dirty="0" smtClean="0"/>
-          </a:p>
-          <a:p>
-            <a:endParaRPr lang="en-US" dirty="0"/>
-          </a:p>
-          <a:p>
-            <a:endParaRPr lang="en-US" dirty="0" smtClean="0"/>
-          </a:p>
-          <a:p>
-            <a:r>
-              <a:rPr lang="en-US" dirty="0" err="1" smtClean="0"/>
-              <a:t>Gitter</a:t>
-            </a:r>
-            <a:r>
-              <a:rPr lang="en-US" dirty="0" smtClean="0"/>
-              <a:t> Note:</a:t>
-            </a:r>
-            <a:endParaRPr lang="en-US" dirty="0"/>
-          </a:p>
-          <a:p>
-            <a:r>
-              <a:rPr lang="en-US" dirty="0" smtClean="0"/>
-              <a:t>Finally</a:t>
-            </a:r>
-            <a:r>
-              <a:rPr lang="en-US" dirty="0"/>
-              <a:t>, as you note in your report, as major challenge will be performing a summarizing meta-analysis to interpret the many clustering results. It will be difficult to interpret your results if they are presented as a series of clustering outputs without any further summarization. Try to arrive at a concise conclusion based on your data - i.e. these cell lines are good models of these tumor samples or cell line/tumor similarity is determined by step X in the pipeline as opposed to an inherent biological feature - and present the results in a way that builds toward that conclusion.</a:t>
-            </a:r>
+          <p:cNvPr id="3" name="Text Placeholder 2"/>
+          <p:cNvSpPr>
+            <a:spLocks noGrp="1"/>
+          </p:cNvSpPr>
+          <p:nvPr>
+            <p:ph type="body" idx="1"/>
+          </p:nvPr>
+        </p:nvSpPr>
+        <p:spPr/>
+        <p:txBody>
+          <a:bodyPr/>
+          <a:lstStyle/>
+          <a:p>
+            <a:endParaRPr lang="en-US"/>
           </a:p>
         </p:txBody>
       </p:sp>
     </p:spTree>
     <p:extLst>
       <p:ext uri="{BB962C8B-B14F-4D97-AF65-F5344CB8AC3E}">
-        <p14:creationId xmlns:p14="http://schemas.microsoft.com/office/powerpoint/2010/main" val="97556309"/>
+        <p14:creationId xmlns:p14="http://schemas.microsoft.com/office/powerpoint/2010/main" val="3287192822"/>
       </p:ext>
     </p:extLst>
   </p:cSld>
@@ -6461,7 +3879,7 @@
           <a:p>
             <a:r>
               <a:rPr lang="en-US" dirty="0" smtClean="0"/>
-              <a:t>Discussion</a:t>
+              <a:t>Challenges</a:t>
             </a:r>
             <a:endParaRPr lang="en-US" dirty="0"/>
           </a:p>
@@ -6469,27 +3887,68 @@
       </p:sp>
       <p:sp>
         <p:nvSpPr>
-          <p:cNvPr id="3" name="Text Placeholder 2"/>
-          <p:cNvSpPr>
-            <a:spLocks noGrp="1"/>
-          </p:cNvSpPr>
-          <p:nvPr>
-            <p:ph type="body" idx="1"/>
-          </p:nvPr>
-        </p:nvSpPr>
-        <p:spPr/>
-        <p:txBody>
-          <a:bodyPr/>
-          <a:lstStyle/>
-          <a:p>
-            <a:endParaRPr lang="en-US"/>
+          <p:cNvPr id="3" name="Content Placeholder 2"/>
+          <p:cNvSpPr>
+            <a:spLocks noGrp="1"/>
+          </p:cNvSpPr>
+          <p:nvPr>
+            <p:ph idx="1"/>
+          </p:nvPr>
+        </p:nvSpPr>
+        <p:spPr/>
+        <p:txBody>
+          <a:bodyPr>
+            <a:normAutofit lnSpcReduction="10000"/>
+          </a:bodyPr>
+          <a:lstStyle/>
+          <a:p>
+            <a:r>
+              <a:rPr lang="en-US" dirty="0" err="1" smtClean="0"/>
+              <a:t>Heatmap</a:t>
+            </a:r>
+            <a:r>
+              <a:rPr lang="en-US" dirty="0" smtClean="0"/>
+              <a:t> generation can be slow and cumbersome</a:t>
+            </a:r>
+          </a:p>
+          <a:p>
+            <a:endParaRPr lang="en-US" dirty="0"/>
+          </a:p>
+          <a:p>
+            <a:r>
+              <a:rPr lang="en-US" dirty="0" smtClean="0"/>
+              <a:t>Data in “rawest” form is difficult to handle</a:t>
+            </a:r>
+          </a:p>
+          <a:p>
+            <a:endParaRPr lang="en-US" dirty="0"/>
+          </a:p>
+          <a:p>
+            <a:r>
+              <a:rPr lang="en-US" dirty="0" smtClean="0"/>
+              <a:t>Downloading </a:t>
+            </a:r>
+            <a:r>
+              <a:rPr lang="en-US" dirty="0" smtClean="0"/>
+              <a:t>data</a:t>
+            </a:r>
+          </a:p>
+          <a:p>
+            <a:endParaRPr lang="en-US" dirty="0"/>
+          </a:p>
+          <a:p>
+            <a:r>
+              <a:rPr lang="en-US" dirty="0" smtClean="0"/>
+              <a:t>Different chips: CCLE v2</a:t>
+            </a:r>
+            <a:endParaRPr lang="en-US" dirty="0" smtClean="0"/>
           </a:p>
         </p:txBody>
       </p:sp>
     </p:spTree>
     <p:extLst>
       <p:ext uri="{BB962C8B-B14F-4D97-AF65-F5344CB8AC3E}">
-        <p14:creationId xmlns:p14="http://schemas.microsoft.com/office/powerpoint/2010/main" val="3287192822"/>
+        <p14:creationId xmlns:p14="http://schemas.microsoft.com/office/powerpoint/2010/main" val="1522108323"/>
       </p:ext>
     </p:extLst>
   </p:cSld>
@@ -6533,7 +3992,7 @@
           <a:p>
             <a:r>
               <a:rPr lang="en-US" dirty="0" smtClean="0"/>
-              <a:t>Implications</a:t>
+              <a:t>Future Work</a:t>
             </a:r>
             <a:endParaRPr lang="en-US" dirty="0"/>
           </a:p>
@@ -6541,27 +4000,31 @@
       </p:sp>
       <p:sp>
         <p:nvSpPr>
-          <p:cNvPr id="3" name="Text Placeholder 2"/>
-          <p:cNvSpPr>
-            <a:spLocks noGrp="1"/>
-          </p:cNvSpPr>
-          <p:nvPr>
-            <p:ph type="body" idx="1"/>
-          </p:nvPr>
-        </p:nvSpPr>
-        <p:spPr/>
-        <p:txBody>
-          <a:bodyPr/>
-          <a:lstStyle/>
-          <a:p>
-            <a:endParaRPr lang="en-US"/>
+          <p:cNvPr id="3" name="Content Placeholder 2"/>
+          <p:cNvSpPr>
+            <a:spLocks noGrp="1"/>
+          </p:cNvSpPr>
+          <p:nvPr>
+            <p:ph idx="1"/>
+          </p:nvPr>
+        </p:nvSpPr>
+        <p:spPr/>
+        <p:txBody>
+          <a:bodyPr/>
+          <a:lstStyle/>
+          <a:p>
+            <a:r>
+              <a:rPr lang="en-US" dirty="0" smtClean="0"/>
+              <a:t>Normalization on pan cancer </a:t>
+            </a:r>
+            <a:endParaRPr lang="en-US" dirty="0"/>
           </a:p>
         </p:txBody>
       </p:sp>
     </p:spTree>
     <p:extLst>
       <p:ext uri="{BB962C8B-B14F-4D97-AF65-F5344CB8AC3E}">
-        <p14:creationId xmlns:p14="http://schemas.microsoft.com/office/powerpoint/2010/main" val="1872873861"/>
+        <p14:creationId xmlns:p14="http://schemas.microsoft.com/office/powerpoint/2010/main" val="2074855179"/>
       </p:ext>
     </p:extLst>
   </p:cSld>
@@ -6687,190 +4150,6 @@
           <a:p>
             <a:r>
               <a:rPr lang="en-US" dirty="0" smtClean="0"/>
-              <a:t>Challenges</a:t>
-            </a:r>
-            <a:endParaRPr lang="en-US" dirty="0"/>
-          </a:p>
-        </p:txBody>
-      </p:sp>
-      <p:sp>
-        <p:nvSpPr>
-          <p:cNvPr id="3" name="Content Placeholder 2"/>
-          <p:cNvSpPr>
-            <a:spLocks noGrp="1"/>
-          </p:cNvSpPr>
-          <p:nvPr>
-            <p:ph idx="1"/>
-          </p:nvPr>
-        </p:nvSpPr>
-        <p:spPr/>
-        <p:txBody>
-          <a:bodyPr>
-            <a:normAutofit lnSpcReduction="10000"/>
-          </a:bodyPr>
-          <a:lstStyle/>
-          <a:p>
-            <a:r>
-              <a:rPr lang="en-US" dirty="0" err="1" smtClean="0"/>
-              <a:t>Heatmap</a:t>
-            </a:r>
-            <a:r>
-              <a:rPr lang="en-US" dirty="0" smtClean="0"/>
-              <a:t> generation can be slow and cumbersome</a:t>
-            </a:r>
-          </a:p>
-          <a:p>
-            <a:endParaRPr lang="en-US" dirty="0"/>
-          </a:p>
-          <a:p>
-            <a:r>
-              <a:rPr lang="en-US" dirty="0" smtClean="0"/>
-              <a:t>Data in “rawest” form is difficult to handle</a:t>
-            </a:r>
-          </a:p>
-          <a:p>
-            <a:endParaRPr lang="en-US" dirty="0"/>
-          </a:p>
-          <a:p>
-            <a:r>
-              <a:rPr lang="en-US" dirty="0" smtClean="0"/>
-              <a:t>Downloading data</a:t>
-            </a:r>
-          </a:p>
-          <a:p>
-            <a:endParaRPr lang="en-US" dirty="0"/>
-          </a:p>
-          <a:p>
-            <a:r>
-              <a:rPr lang="en-US" dirty="0" smtClean="0"/>
-              <a:t>Different chips: CCLE v2</a:t>
-            </a:r>
-          </a:p>
-        </p:txBody>
-      </p:sp>
-    </p:spTree>
-    <p:extLst>
-      <p:ext uri="{BB962C8B-B14F-4D97-AF65-F5344CB8AC3E}">
-        <p14:creationId xmlns:p14="http://schemas.microsoft.com/office/powerpoint/2010/main" val="1522108323"/>
-      </p:ext>
-    </p:extLst>
-  </p:cSld>
-  <p:clrMapOvr>
-    <a:masterClrMapping/>
-  </p:clrMapOvr>
-</p:sld>
-</file>
-
-<file path=ppt/slides/slide21.xml><?xml version="1.0" encoding="utf-8"?>
-<p:sld xmlns:a="http://schemas.openxmlformats.org/drawingml/2006/main" xmlns:r="http://schemas.openxmlformats.org/officeDocument/2006/relationships" xmlns:p="http://schemas.openxmlformats.org/presentationml/2006/main">
-  <p:cSld>
-    <p:spTree>
-      <p:nvGrpSpPr>
-        <p:cNvPr id="1" name=""/>
-        <p:cNvGrpSpPr/>
-        <p:nvPr/>
-      </p:nvGrpSpPr>
-      <p:grpSpPr>
-        <a:xfrm>
-          <a:off x="0" y="0"/>
-          <a:ext cx="0" cy="0"/>
-          <a:chOff x="0" y="0"/>
-          <a:chExt cx="0" cy="0"/>
-        </a:xfrm>
-      </p:grpSpPr>
-      <p:sp>
-        <p:nvSpPr>
-          <p:cNvPr id="2" name="Title 1"/>
-          <p:cNvSpPr>
-            <a:spLocks noGrp="1"/>
-          </p:cNvSpPr>
-          <p:nvPr>
-            <p:ph type="title"/>
-          </p:nvPr>
-        </p:nvSpPr>
-        <p:spPr/>
-        <p:txBody>
-          <a:bodyPr/>
-          <a:lstStyle/>
-          <a:p>
-            <a:r>
-              <a:rPr lang="en-US" dirty="0" smtClean="0"/>
-              <a:t>Future Work</a:t>
-            </a:r>
-            <a:endParaRPr lang="en-US" dirty="0"/>
-          </a:p>
-        </p:txBody>
-      </p:sp>
-      <p:sp>
-        <p:nvSpPr>
-          <p:cNvPr id="3" name="Content Placeholder 2"/>
-          <p:cNvSpPr>
-            <a:spLocks noGrp="1"/>
-          </p:cNvSpPr>
-          <p:nvPr>
-            <p:ph idx="1"/>
-          </p:nvPr>
-        </p:nvSpPr>
-        <p:spPr/>
-        <p:txBody>
-          <a:bodyPr/>
-          <a:lstStyle/>
-          <a:p>
-            <a:r>
-              <a:rPr lang="en-US" dirty="0" smtClean="0"/>
-              <a:t>Normalization on pan cancer </a:t>
-            </a:r>
-            <a:endParaRPr lang="en-US" dirty="0"/>
-          </a:p>
-        </p:txBody>
-      </p:sp>
-    </p:spTree>
-    <p:extLst>
-      <p:ext uri="{BB962C8B-B14F-4D97-AF65-F5344CB8AC3E}">
-        <p14:creationId xmlns:p14="http://schemas.microsoft.com/office/powerpoint/2010/main" val="2074855179"/>
-      </p:ext>
-    </p:extLst>
-  </p:cSld>
-  <p:clrMapOvr>
-    <a:masterClrMapping/>
-  </p:clrMapOvr>
-</p:sld>
-</file>
-
-<file path=ppt/slides/slide22.xml><?xml version="1.0" encoding="utf-8"?>
-<p:sld xmlns:a="http://schemas.openxmlformats.org/drawingml/2006/main" xmlns:r="http://schemas.openxmlformats.org/officeDocument/2006/relationships" xmlns:p="http://schemas.openxmlformats.org/presentationml/2006/main">
-  <p:cSld>
-    <p:spTree>
-      <p:nvGrpSpPr>
-        <p:cNvPr id="1" name=""/>
-        <p:cNvGrpSpPr/>
-        <p:nvPr/>
-      </p:nvGrpSpPr>
-      <p:grpSpPr>
-        <a:xfrm>
-          <a:off x="0" y="0"/>
-          <a:ext cx="0" cy="0"/>
-          <a:chOff x="0" y="0"/>
-          <a:chExt cx="0" cy="0"/>
-        </a:xfrm>
-      </p:grpSpPr>
-      <p:sp>
-        <p:nvSpPr>
-          <p:cNvPr id="2" name="Title 1"/>
-          <p:cNvSpPr>
-            <a:spLocks noGrp="1"/>
-          </p:cNvSpPr>
-          <p:nvPr>
-            <p:ph type="title"/>
-          </p:nvPr>
-        </p:nvSpPr>
-        <p:spPr/>
-        <p:txBody>
-          <a:bodyPr/>
-          <a:lstStyle/>
-          <a:p>
-            <a:r>
-              <a:rPr lang="en-US" dirty="0" smtClean="0"/>
               <a:t>References</a:t>
             </a:r>
             <a:endParaRPr lang="en-US" dirty="0"/>
@@ -7105,28 +4384,14 @@
         <p:spPr/>
         <p:txBody>
           <a:bodyPr>
-            <a:normAutofit fontScale="62500" lnSpcReduction="20000"/>
+            <a:normAutofit fontScale="70000" lnSpcReduction="20000"/>
           </a:bodyPr>
           <a:lstStyle/>
           <a:p>
             <a:r>
               <a:rPr lang="en-US" dirty="0"/>
-              <a:t>A grand debate has been present in the cancer biology research community in reference to the accuracy of using cell lines as accurate representations of a tumor. To delve into the efficacy of cancer cell lines many researchers have used hierarchical clustering to show the genomic difference between the two model systems. While some researchers have found cancer cell lines to be a useful model1 others have shown that many cell lines are poor representations of their respective primary samples. 2 Delving further into this paradox, it is readily obvious that one of the primary differences between these two findings is the clustering pipelines that each utilizes. Not only is the clustering algorithm itself different but also the pre processing steps to “prepare” the data is different. This project is being proposed to evaluate a number of different clustering algorithms to assess and validate the numerous assumptions that are used in each</a:t>
-            </a:r>
-            <a:r>
-              <a:rPr lang="en-US" dirty="0" smtClean="0"/>
-              <a:t>.</a:t>
-            </a:r>
-          </a:p>
-          <a:p>
-            <a:endParaRPr lang="en-US" dirty="0"/>
-          </a:p>
-          <a:p>
-            <a:r>
-              <a:rPr lang="en-US" b="1" dirty="0" smtClean="0"/>
-              <a:t>HOW DOES PREPROCESSING EFFECT RESULTS, NOT PICKING BEST PREPROCESSING STEPS</a:t>
-            </a:r>
-            <a:endParaRPr lang="en-US" b="1" dirty="0"/>
+              <a:t>A grand debate has been present in the cancer biology research community in reference to the accuracy of using cell lines as accurate representations of a tumor. To delve into the efficacy of cancer cell lines many researchers have used hierarchical clustering to show the genomic difference between the two model systems. While some researchers have found cancer cell lines to be a useful model1 others have shown that many cell lines are poor representations of their respective primary samples. 2 Delving further into this paradox, it is readily obvious that one of the primary differences between these two findings is the clustering pipelines that each utilizes. Not only is the clustering algorithm itself different but also the pre processing steps to “prepare” the data is different. This project is being proposed to evaluate a number of different clustering algorithms to assess and validate the numerous assumptions that are used in each.</a:t>
+            </a:r>
           </a:p>
         </p:txBody>
       </p:sp>
@@ -7306,7 +4571,7 @@
       </p:grpSpPr>
       <p:sp>
         <p:nvSpPr>
-          <p:cNvPr id="2" name="Title 1"/>
+          <p:cNvPr id="4" name="Title 3"/>
           <p:cNvSpPr>
             <a:spLocks noGrp="1"/>
           </p:cNvSpPr>
@@ -7321,7 +4586,7 @@
           <a:p>
             <a:r>
               <a:rPr lang="en-US" dirty="0" smtClean="0"/>
-              <a:t>Matrix of source vs. type</a:t>
+              <a:t>Methodological Overview</a:t>
             </a:r>
             <a:endParaRPr lang="en-US" dirty="0"/>
           </a:p>
@@ -7329,27 +4594,30 @@
       </p:sp>
       <p:sp>
         <p:nvSpPr>
-          <p:cNvPr id="3" name="Text Placeholder 2"/>
-          <p:cNvSpPr>
-            <a:spLocks noGrp="1"/>
-          </p:cNvSpPr>
-          <p:nvPr>
-            <p:ph type="body" idx="1"/>
-          </p:nvPr>
-        </p:nvSpPr>
-        <p:spPr/>
-        <p:txBody>
-          <a:bodyPr/>
-          <a:lstStyle/>
-          <a:p>
-            <a:endParaRPr lang="en-US"/>
+          <p:cNvPr id="5" name="Content Placeholder 4"/>
+          <p:cNvSpPr>
+            <a:spLocks noGrp="1"/>
+          </p:cNvSpPr>
+          <p:nvPr>
+            <p:ph idx="1"/>
+          </p:nvPr>
+        </p:nvSpPr>
+        <p:spPr/>
+        <p:txBody>
+          <a:bodyPr/>
+          <a:lstStyle/>
+          <a:p>
+            <a:r>
+              <a:rPr lang="en-US" dirty="0"/>
+              <a:t>In order to investigate the relationship between analysis pipeline and clustering results the authors will build out a two step pipeline with modular components. The first step will represent the preprocessing that is typically done on gene expression data. Clustering will be housed in the second step module.</a:t>
+            </a:r>
           </a:p>
         </p:txBody>
       </p:sp>
     </p:spTree>
     <p:extLst>
       <p:ext uri="{BB962C8B-B14F-4D97-AF65-F5344CB8AC3E}">
-        <p14:creationId xmlns:p14="http://schemas.microsoft.com/office/powerpoint/2010/main" val="1967409516"/>
+        <p14:creationId xmlns:p14="http://schemas.microsoft.com/office/powerpoint/2010/main" val="2507868369"/>
       </p:ext>
     </p:extLst>
   </p:cSld>
@@ -7378,7 +4646,7 @@
       </p:grpSpPr>
       <p:sp>
         <p:nvSpPr>
-          <p:cNvPr id="4" name="Title 3"/>
+          <p:cNvPr id="2" name="Title 1"/>
           <p:cNvSpPr>
             <a:spLocks noGrp="1"/>
           </p:cNvSpPr>
@@ -7393,7 +4661,7 @@
           <a:p>
             <a:r>
               <a:rPr lang="en-US" dirty="0" smtClean="0"/>
-              <a:t>Methodological Overview</a:t>
+              <a:t>Preprocessing</a:t>
             </a:r>
             <a:endParaRPr lang="en-US" dirty="0"/>
           </a:p>
@@ -7401,7 +4669,7 @@
       </p:sp>
       <p:sp>
         <p:nvSpPr>
-          <p:cNvPr id="5" name="Content Placeholder 4"/>
+          <p:cNvPr id="3" name="Content Placeholder 2"/>
           <p:cNvSpPr>
             <a:spLocks noGrp="1"/>
           </p:cNvSpPr>
@@ -7416,45 +4684,55 @@
           <a:p>
             <a:r>
               <a:rPr lang="en-US" dirty="0"/>
-              <a:t>In order to investigate the relationship between analysis pipeline and clustering results the authors will build out a two step pipeline with modular components. The first step will represent the preprocessing that is typically done on gene expression data. Clustering will be housed in the second step module.</a:t>
-            </a:r>
-          </a:p>
-        </p:txBody>
-      </p:sp>
-      <p:pic>
-        <p:nvPicPr>
-          <p:cNvPr id="6" name="Picture 5" descr="FullSizeRender.jpg"/>
-          <p:cNvPicPr>
-            <a:picLocks noChangeAspect="1"/>
-          </p:cNvPicPr>
-          <p:nvPr/>
-        </p:nvPicPr>
-        <p:blipFill>
-          <a:blip r:embed="rId3">
-            <a:extLst>
-              <a:ext uri="{28A0092B-C50C-407E-A947-70E740481C1C}">
-                <a14:useLocalDpi xmlns:a14="http://schemas.microsoft.com/office/drawing/2010/main" val="0"/>
-              </a:ext>
-            </a:extLst>
-          </a:blip>
-          <a:stretch>
-            <a:fillRect/>
-          </a:stretch>
-        </p:blipFill>
-        <p:spPr>
-          <a:xfrm>
-            <a:off x="1160523" y="3241301"/>
-            <a:ext cx="2533921" cy="3378561"/>
-          </a:xfrm>
-          <a:prstGeom prst="rect">
-            <a:avLst/>
-          </a:prstGeom>
-        </p:spPr>
-      </p:pic>
+              <a:t>For the preprocessing module we would like to implement at least two methods:</a:t>
+            </a:r>
+          </a:p>
+          <a:p>
+            <a:r>
+              <a:rPr lang="en-US" dirty="0"/>
+              <a:t>Individual Data Set Normalization Joint Data Set </a:t>
+            </a:r>
+            <a:r>
+              <a:rPr lang="en-US" dirty="0" smtClean="0"/>
+              <a:t>Normalization</a:t>
+            </a:r>
+          </a:p>
+          <a:p>
+            <a:endParaRPr lang="en-US" dirty="0"/>
+          </a:p>
+          <a:p>
+            <a:r>
+              <a:rPr lang="en-US" dirty="0" smtClean="0"/>
+              <a:t>Normalization: </a:t>
+            </a:r>
+          </a:p>
+          <a:p>
+            <a:r>
+              <a:rPr lang="en-US" dirty="0" err="1" smtClean="0"/>
+              <a:t>Quantile</a:t>
+            </a:r>
+            <a:r>
+              <a:rPr lang="en-US" dirty="0" smtClean="0"/>
+              <a:t>: none, all 4, Paired (ovary and </a:t>
+            </a:r>
+            <a:r>
+              <a:rPr lang="en-US" dirty="0" err="1" smtClean="0"/>
+              <a:t>gbm</a:t>
+            </a:r>
+            <a:r>
+              <a:rPr lang="en-US" dirty="0" smtClean="0"/>
+              <a:t>)</a:t>
+            </a:r>
+          </a:p>
+          <a:p>
+            <a:endParaRPr lang="en-US" dirty="0"/>
+          </a:p>
+        </p:txBody>
+      </p:sp>
     </p:spTree>
     <p:extLst>
       <p:ext uri="{BB962C8B-B14F-4D97-AF65-F5344CB8AC3E}">
-        <p14:creationId xmlns:p14="http://schemas.microsoft.com/office/powerpoint/2010/main" val="2507868369"/>
+        <p14:creationId xmlns:p14="http://schemas.microsoft.com/office/powerpoint/2010/main" val="1947356660"/>
       </p:ext>
     </p:extLst>
   </p:cSld>
@@ -7498,83 +4776,136 @@
           <a:p>
             <a:r>
               <a:rPr lang="en-US" dirty="0" smtClean="0"/>
-              <a:t>Preprocessing</a:t>
+              <a:t>PCA</a:t>
             </a:r>
             <a:endParaRPr lang="en-US" dirty="0"/>
           </a:p>
         </p:txBody>
       </p:sp>
-      <p:sp>
-        <p:nvSpPr>
-          <p:cNvPr id="3" name="Content Placeholder 2"/>
-          <p:cNvSpPr>
-            <a:spLocks noGrp="1"/>
-          </p:cNvSpPr>
+      <p:pic>
+        <p:nvPicPr>
+          <p:cNvPr id="4" name="Content Placeholder 3" descr="FullSizeRender.jpg"/>
+          <p:cNvPicPr>
+            <a:picLocks noGrp="1" noChangeAspect="1"/>
+          </p:cNvPicPr>
           <p:nvPr>
             <p:ph idx="1"/>
           </p:nvPr>
-        </p:nvSpPr>
-        <p:spPr/>
-        <p:txBody>
-          <a:bodyPr/>
-          <a:lstStyle/>
-          <a:p>
-            <a:r>
-              <a:rPr lang="en-US" dirty="0"/>
-              <a:t>For the preprocessing module we would like to implement at least two methods:</a:t>
-            </a:r>
-          </a:p>
-          <a:p>
-            <a:r>
-              <a:rPr lang="en-US" dirty="0"/>
-              <a:t>Individual Data Set Normalization Joint Data Set </a:t>
-            </a:r>
-            <a:r>
-              <a:rPr lang="en-US" dirty="0" smtClean="0"/>
-              <a:t>Normalization</a:t>
-            </a:r>
-          </a:p>
-          <a:p>
-            <a:endParaRPr lang="en-US" dirty="0"/>
-          </a:p>
-          <a:p>
-            <a:r>
-              <a:rPr lang="en-US" dirty="0" smtClean="0"/>
-              <a:t>Normalization: </a:t>
-            </a:r>
-          </a:p>
-          <a:p>
-            <a:r>
-              <a:rPr lang="en-US" dirty="0" err="1" smtClean="0"/>
-              <a:t>Quantile</a:t>
-            </a:r>
-            <a:r>
-              <a:rPr lang="en-US" dirty="0" smtClean="0"/>
-              <a:t>: none, all 4, Paired (ovary and </a:t>
-            </a:r>
-            <a:r>
-              <a:rPr lang="en-US" dirty="0" err="1" smtClean="0"/>
-              <a:t>gbm</a:t>
-            </a:r>
-            <a:r>
-              <a:rPr lang="en-US" dirty="0" smtClean="0"/>
-              <a:t>), Z score </a:t>
-            </a:r>
-            <a:r>
-              <a:rPr lang="en-US" b="1" dirty="0" smtClean="0"/>
-              <a:t>ERKIN MAKE THIS PRETTY</a:t>
-            </a:r>
-            <a:endParaRPr lang="en-US" dirty="0" smtClean="0"/>
-          </a:p>
-          <a:p>
-            <a:endParaRPr lang="en-US" dirty="0"/>
-          </a:p>
-        </p:txBody>
-      </p:sp>
+        </p:nvPicPr>
+        <p:blipFill>
+          <a:blip r:embed="rId2">
+            <a:extLst>
+              <a:ext uri="{28A0092B-C50C-407E-A947-70E740481C1C}">
+                <a14:useLocalDpi xmlns:a14="http://schemas.microsoft.com/office/drawing/2010/main" val="0"/>
+              </a:ext>
+            </a:extLst>
+          </a:blip>
+          <a:srcRect t="29376" b="29376"/>
+          <a:stretch>
+            <a:fillRect/>
+          </a:stretch>
+        </p:blipFill>
+        <p:spPr>
+          <a:xfrm>
+            <a:off x="232320" y="1417638"/>
+            <a:ext cx="4490150" cy="2469410"/>
+          </a:xfrm>
+        </p:spPr>
+      </p:pic>
+      <p:pic>
+        <p:nvPicPr>
+          <p:cNvPr id="5" name="Picture 4" descr="FullSizeRender (2).jpg"/>
+          <p:cNvPicPr>
+            <a:picLocks noChangeAspect="1"/>
+          </p:cNvPicPr>
+          <p:nvPr/>
+        </p:nvPicPr>
+        <p:blipFill>
+          <a:blip r:embed="rId3">
+            <a:extLst>
+              <a:ext uri="{28A0092B-C50C-407E-A947-70E740481C1C}">
+                <a14:useLocalDpi xmlns:a14="http://schemas.microsoft.com/office/drawing/2010/main" val="0"/>
+              </a:ext>
+            </a:extLst>
+          </a:blip>
+          <a:stretch>
+            <a:fillRect/>
+          </a:stretch>
+        </p:blipFill>
+        <p:spPr>
+          <a:xfrm>
+            <a:off x="5032048" y="1417638"/>
+            <a:ext cx="3292547" cy="2469410"/>
+          </a:xfrm>
+          <a:prstGeom prst="rect">
+            <a:avLst/>
+          </a:prstGeom>
+        </p:spPr>
+      </p:pic>
+      <p:pic>
+        <p:nvPicPr>
+          <p:cNvPr id="6" name="Picture 5" descr="FullSizeRender.jpg"/>
+          <p:cNvPicPr>
+            <a:picLocks noChangeAspect="1"/>
+          </p:cNvPicPr>
+          <p:nvPr/>
+        </p:nvPicPr>
+        <p:blipFill>
+          <a:blip r:embed="rId2">
+            <a:extLst>
+              <a:ext uri="{28A0092B-C50C-407E-A947-70E740481C1C}">
+                <a14:useLocalDpi xmlns:a14="http://schemas.microsoft.com/office/drawing/2010/main" val="0"/>
+              </a:ext>
+            </a:extLst>
+          </a:blip>
+          <a:stretch>
+            <a:fillRect/>
+          </a:stretch>
+        </p:blipFill>
+        <p:spPr>
+          <a:xfrm>
+            <a:off x="1160523" y="3241301"/>
+            <a:ext cx="2533921" cy="3378561"/>
+          </a:xfrm>
+          <a:prstGeom prst="rect">
+            <a:avLst/>
+          </a:prstGeom>
+        </p:spPr>
+      </p:pic>
+      <p:pic>
+        <p:nvPicPr>
+          <p:cNvPr id="8" name="Picture 7" descr="FullSizeRender (3).jpg"/>
+          <p:cNvPicPr>
+            <a:picLocks noChangeAspect="1"/>
+          </p:cNvPicPr>
+          <p:nvPr/>
+        </p:nvPicPr>
+        <p:blipFill>
+          <a:blip r:embed="rId4">
+            <a:extLst>
+              <a:ext uri="{28A0092B-C50C-407E-A947-70E740481C1C}">
+                <a14:useLocalDpi xmlns:a14="http://schemas.microsoft.com/office/drawing/2010/main" val="0"/>
+              </a:ext>
+            </a:extLst>
+          </a:blip>
+          <a:stretch>
+            <a:fillRect/>
+          </a:stretch>
+        </p:blipFill>
+        <p:spPr>
+          <a:xfrm>
+            <a:off x="5208355" y="2902314"/>
+            <a:ext cx="2252355" cy="3003140"/>
+          </a:xfrm>
+          <a:prstGeom prst="rect">
+            <a:avLst/>
+          </a:prstGeom>
+        </p:spPr>
+      </p:pic>
     </p:spTree>
     <p:extLst>
       <p:ext uri="{BB962C8B-B14F-4D97-AF65-F5344CB8AC3E}">
-        <p14:creationId xmlns:p14="http://schemas.microsoft.com/office/powerpoint/2010/main" val="1947356660"/>
+        <p14:creationId xmlns:p14="http://schemas.microsoft.com/office/powerpoint/2010/main" val="3101508401"/>
       </p:ext>
     </p:extLst>
   </p:cSld>
@@ -7900,324 +5231,4 @@
   </a:objectDefaults>
   <a:extraClrSchemeLst/>
 </a:theme>
-</file>
-
-<file path=ppt/theme/theme2.xml><?xml version="1.0" encoding="utf-8"?>
-<a:theme xmlns:a="http://schemas.openxmlformats.org/drawingml/2006/main" name="Office Theme">
-  <a:themeElements>
-    <a:clrScheme name="Office">
-      <a:dk1>
-        <a:sysClr val="windowText" lastClr="000000"/>
-      </a:dk1>
-      <a:lt1>
-        <a:sysClr val="window" lastClr="FFFFFF"/>
-      </a:lt1>
-      <a:dk2>
-        <a:srgbClr val="1F497D"/>
-      </a:dk2>
-      <a:lt2>
-        <a:srgbClr val="EEECE1"/>
-      </a:lt2>
-      <a:accent1>
-        <a:srgbClr val="4F81BD"/>
-      </a:accent1>
-      <a:accent2>
-        <a:srgbClr val="C0504D"/>
-      </a:accent2>
-      <a:accent3>
-        <a:srgbClr val="9BBB59"/>
-      </a:accent3>
-      <a:accent4>
-        <a:srgbClr val="8064A2"/>
-      </a:accent4>
-      <a:accent5>
-        <a:srgbClr val="4BACC6"/>
-      </a:accent5>
-      <a:accent6>
-        <a:srgbClr val="F79646"/>
-      </a:accent6>
-      <a:hlink>
-        <a:srgbClr val="0000FF"/>
-      </a:hlink>
-      <a:folHlink>
-        <a:srgbClr val="800080"/>
-      </a:folHlink>
-    </a:clrScheme>
-    <a:fontScheme name="Office">
-      <a:majorFont>
-        <a:latin typeface="Calibri"/>
-        <a:ea typeface=""/>
-        <a:cs typeface=""/>
-        <a:font script="Jpan" typeface="ＭＳ Ｐゴシック"/>
-        <a:font script="Hang" typeface="맑은 고딕"/>
-        <a:font script="Hans" typeface="宋体"/>
-        <a:font script="Hant" typeface="新細明體"/>
-        <a:font script="Arab" typeface="Times New Roman"/>
-        <a:font script="Hebr" typeface="Times New Roman"/>
-        <a:font script="Thai" typeface="Angsana New"/>
-        <a:font script="Ethi" typeface="Nyala"/>
-        <a:font script="Beng" typeface="Vrinda"/>
-        <a:font script="Gujr" typeface="Shruti"/>
-        <a:font script="Khmr" typeface="MoolBoran"/>
-        <a:font script="Knda" typeface="Tunga"/>
-        <a:font script="Guru" typeface="Raavi"/>
-        <a:font script="Cans" typeface="Euphemia"/>
-        <a:font script="Cher" typeface="Plantagenet Cherokee"/>
-        <a:font script="Yiii" typeface="Microsoft Yi Baiti"/>
-        <a:font script="Tibt" typeface="Microsoft Himalaya"/>
-        <a:font script="Thaa" typeface="MV Boli"/>
-        <a:font script="Deva" typeface="Mangal"/>
-        <a:font script="Telu" typeface="Gautami"/>
-        <a:font script="Taml" typeface="Latha"/>
-        <a:font script="Syrc" typeface="Estrangelo Edessa"/>
-        <a:font script="Orya" typeface="Kalinga"/>
-        <a:font script="Mlym" typeface="Kartika"/>
-        <a:font script="Laoo" typeface="DokChampa"/>
-        <a:font script="Sinh" typeface="Iskoola Pota"/>
-        <a:font script="Mong" typeface="Mongolian Baiti"/>
-        <a:font script="Viet" typeface="Times New Roman"/>
-        <a:font script="Uigh" typeface="Microsoft Uighur"/>
-        <a:font script="Geor" typeface="Sylfaen"/>
-      </a:majorFont>
-      <a:minorFont>
-        <a:latin typeface="Calibri"/>
-        <a:ea typeface=""/>
-        <a:cs typeface=""/>
-        <a:font script="Jpan" typeface="ＭＳ Ｐゴシック"/>
-        <a:font script="Hang" typeface="맑은 고딕"/>
-        <a:font script="Hans" typeface="宋体"/>
-        <a:font script="Hant" typeface="新細明體"/>
-        <a:font script="Arab" typeface="Arial"/>
-        <a:font script="Hebr" typeface="Arial"/>
-        <a:font script="Thai" typeface="Cordia New"/>
-        <a:font script="Ethi" typeface="Nyala"/>
-        <a:font script="Beng" typeface="Vrinda"/>
-        <a:font script="Gujr" typeface="Shruti"/>
-        <a:font script="Khmr" typeface="DaunPenh"/>
-        <a:font script="Knda" typeface="Tunga"/>
-        <a:font script="Guru" typeface="Raavi"/>
-        <a:font script="Cans" typeface="Euphemia"/>
-        <a:font script="Cher" typeface="Plantagenet Cherokee"/>
-        <a:font script="Yiii" typeface="Microsoft Yi Baiti"/>
-        <a:font script="Tibt" typeface="Microsoft Himalaya"/>
-        <a:font script="Thaa" typeface="MV Boli"/>
-        <a:font script="Deva" typeface="Mangal"/>
-        <a:font script="Telu" typeface="Gautami"/>
-        <a:font script="Taml" typeface="Latha"/>
-        <a:font script="Syrc" typeface="Estrangelo Edessa"/>
-        <a:font script="Orya" typeface="Kalinga"/>
-        <a:font script="Mlym" typeface="Kartika"/>
-        <a:font script="Laoo" typeface="DokChampa"/>
-        <a:font script="Sinh" typeface="Iskoola Pota"/>
-        <a:font script="Mong" typeface="Mongolian Baiti"/>
-        <a:font script="Viet" typeface="Arial"/>
-        <a:font script="Uigh" typeface="Microsoft Uighur"/>
-        <a:font script="Geor" typeface="Sylfaen"/>
-      </a:minorFont>
-    </a:fontScheme>
-    <a:fmtScheme name="Office">
-      <a:fillStyleLst>
-        <a:solidFill>
-          <a:schemeClr val="phClr"/>
-        </a:solidFill>
-        <a:gradFill rotWithShape="1">
-          <a:gsLst>
-            <a:gs pos="0">
-              <a:schemeClr val="phClr">
-                <a:tint val="50000"/>
-                <a:satMod val="300000"/>
-              </a:schemeClr>
-            </a:gs>
-            <a:gs pos="35000">
-              <a:schemeClr val="phClr">
-                <a:tint val="37000"/>
-                <a:satMod val="300000"/>
-              </a:schemeClr>
-            </a:gs>
-            <a:gs pos="100000">
-              <a:schemeClr val="phClr">
-                <a:tint val="15000"/>
-                <a:satMod val="350000"/>
-              </a:schemeClr>
-            </a:gs>
-          </a:gsLst>
-          <a:lin ang="16200000" scaled="1"/>
-        </a:gradFill>
-        <a:gradFill rotWithShape="1">
-          <a:gsLst>
-            <a:gs pos="0">
-              <a:schemeClr val="phClr">
-                <a:tint val="100000"/>
-                <a:shade val="100000"/>
-                <a:satMod val="130000"/>
-              </a:schemeClr>
-            </a:gs>
-            <a:gs pos="100000">
-              <a:schemeClr val="phClr">
-                <a:tint val="50000"/>
-                <a:shade val="100000"/>
-                <a:satMod val="350000"/>
-              </a:schemeClr>
-            </a:gs>
-          </a:gsLst>
-          <a:lin ang="16200000" scaled="0"/>
-        </a:gradFill>
-      </a:fillStyleLst>
-      <a:lnStyleLst>
-        <a:ln w="9525" cap="flat" cmpd="sng" algn="ctr">
-          <a:solidFill>
-            <a:schemeClr val="phClr">
-              <a:shade val="95000"/>
-              <a:satMod val="105000"/>
-            </a:schemeClr>
-          </a:solidFill>
-          <a:prstDash val="solid"/>
-        </a:ln>
-        <a:ln w="25400" cap="flat" cmpd="sng" algn="ctr">
-          <a:solidFill>
-            <a:schemeClr val="phClr"/>
-          </a:solidFill>
-          <a:prstDash val="solid"/>
-        </a:ln>
-        <a:ln w="38100" cap="flat" cmpd="sng" algn="ctr">
-          <a:solidFill>
-            <a:schemeClr val="phClr"/>
-          </a:solidFill>
-          <a:prstDash val="solid"/>
-        </a:ln>
-      </a:lnStyleLst>
-      <a:effectStyleLst>
-        <a:effectStyle>
-          <a:effectLst>
-            <a:outerShdw blurRad="40000" dist="20000" dir="5400000" rotWithShape="0">
-              <a:srgbClr val="000000">
-                <a:alpha val="38000"/>
-              </a:srgbClr>
-            </a:outerShdw>
-          </a:effectLst>
-        </a:effectStyle>
-        <a:effectStyle>
-          <a:effectLst>
-            <a:outerShdw blurRad="40000" dist="23000" dir="5400000" rotWithShape="0">
-              <a:srgbClr val="000000">
-                <a:alpha val="35000"/>
-              </a:srgbClr>
-            </a:outerShdw>
-          </a:effectLst>
-        </a:effectStyle>
-        <a:effectStyle>
-          <a:effectLst>
-            <a:outerShdw blurRad="40000" dist="23000" dir="5400000" rotWithShape="0">
-              <a:srgbClr val="000000">
-                <a:alpha val="35000"/>
-              </a:srgbClr>
-            </a:outerShdw>
-          </a:effectLst>
-          <a:scene3d>
-            <a:camera prst="orthographicFront">
-              <a:rot lat="0" lon="0" rev="0"/>
-            </a:camera>
-            <a:lightRig rig="threePt" dir="t">
-              <a:rot lat="0" lon="0" rev="1200000"/>
-            </a:lightRig>
-          </a:scene3d>
-          <a:sp3d>
-            <a:bevelT w="63500" h="25400"/>
-          </a:sp3d>
-        </a:effectStyle>
-      </a:effectStyleLst>
-      <a:bgFillStyleLst>
-        <a:solidFill>
-          <a:schemeClr val="phClr"/>
-        </a:solidFill>
-        <a:gradFill rotWithShape="1">
-          <a:gsLst>
-            <a:gs pos="0">
-              <a:schemeClr val="phClr">
-                <a:tint val="40000"/>
-                <a:satMod val="350000"/>
-              </a:schemeClr>
-            </a:gs>
-            <a:gs pos="40000">
-              <a:schemeClr val="phClr">
-                <a:tint val="45000"/>
-                <a:shade val="99000"/>
-                <a:satMod val="350000"/>
-              </a:schemeClr>
-            </a:gs>
-            <a:gs pos="100000">
-              <a:schemeClr val="phClr">
-                <a:shade val="20000"/>
-                <a:satMod val="255000"/>
-              </a:schemeClr>
-            </a:gs>
-          </a:gsLst>
-          <a:path path="circle">
-            <a:fillToRect l="50000" t="-80000" r="50000" b="180000"/>
-          </a:path>
-        </a:gradFill>
-        <a:gradFill rotWithShape="1">
-          <a:gsLst>
-            <a:gs pos="0">
-              <a:schemeClr val="phClr">
-                <a:tint val="80000"/>
-                <a:satMod val="300000"/>
-              </a:schemeClr>
-            </a:gs>
-            <a:gs pos="100000">
-              <a:schemeClr val="phClr">
-                <a:shade val="30000"/>
-                <a:satMod val="200000"/>
-              </a:schemeClr>
-            </a:gs>
-          </a:gsLst>
-          <a:path path="circle">
-            <a:fillToRect l="50000" t="50000" r="50000" b="50000"/>
-          </a:path>
-        </a:gradFill>
-      </a:bgFillStyleLst>
-    </a:fmtScheme>
-  </a:themeElements>
-  <a:objectDefaults>
-    <a:spDef>
-      <a:spPr/>
-      <a:bodyPr/>
-      <a:lstStyle/>
-      <a:style>
-        <a:lnRef idx="1">
-          <a:schemeClr val="accent1"/>
-        </a:lnRef>
-        <a:fillRef idx="3">
-          <a:schemeClr val="accent1"/>
-        </a:fillRef>
-        <a:effectRef idx="2">
-          <a:schemeClr val="accent1"/>
-        </a:effectRef>
-        <a:fontRef idx="minor">
-          <a:schemeClr val="lt1"/>
-        </a:fontRef>
-      </a:style>
-    </a:spDef>
-    <a:lnDef>
-      <a:spPr/>
-      <a:bodyPr/>
-      <a:lstStyle/>
-      <a:style>
-        <a:lnRef idx="2">
-          <a:schemeClr val="accent1"/>
-        </a:lnRef>
-        <a:fillRef idx="0">
-          <a:schemeClr val="accent1"/>
-        </a:fillRef>
-        <a:effectRef idx="1">
-          <a:schemeClr val="accent1"/>
-        </a:effectRef>
-        <a:fontRef idx="minor">
-          <a:schemeClr val="tx1"/>
-        </a:fontRef>
-      </a:style>
-    </a:lnDef>
-  </a:objectDefaults>
-  <a:extraClrSchemeLst/>
-</a:theme>
 </file>
</xml_diff>